<commit_message>
Update Creating iOS & Android Apps In C# Using Xamarin.pptx
</commit_message>
<xml_diff>
--- a/Creating iOS & Android Apps In C# Using Xamarin.pptx
+++ b/Creating iOS & Android Apps In C# Using Xamarin.pptx
@@ -5,7 +5,7 @@
     <p:sldMasterId id="2147483715" r:id="rId4"/>
   </p:sldMasterIdLst>
   <p:notesMasterIdLst>
-    <p:notesMasterId r:id="rId21"/>
+    <p:notesMasterId r:id="rId19"/>
   </p:notesMasterIdLst>
   <p:sldIdLst>
     <p:sldId id="256" r:id="rId5"/>
@@ -13,17 +13,15 @@
     <p:sldId id="1555" r:id="rId7"/>
     <p:sldId id="1566" r:id="rId8"/>
     <p:sldId id="1934" r:id="rId9"/>
-    <p:sldId id="1571" r:id="rId10"/>
-    <p:sldId id="1621" r:id="rId11"/>
-    <p:sldId id="1560" r:id="rId12"/>
-    <p:sldId id="1575" r:id="rId13"/>
-    <p:sldId id="1941" r:id="rId14"/>
-    <p:sldId id="1943" r:id="rId15"/>
-    <p:sldId id="1947" r:id="rId16"/>
-    <p:sldId id="257" r:id="rId17"/>
-    <p:sldId id="260" r:id="rId18"/>
-    <p:sldId id="261" r:id="rId19"/>
-    <p:sldId id="262" r:id="rId20"/>
+    <p:sldId id="1575" r:id="rId10"/>
+    <p:sldId id="1571" r:id="rId11"/>
+    <p:sldId id="1941" r:id="rId12"/>
+    <p:sldId id="1943" r:id="rId13"/>
+    <p:sldId id="1947" r:id="rId14"/>
+    <p:sldId id="257" r:id="rId15"/>
+    <p:sldId id="260" r:id="rId16"/>
+    <p:sldId id="261" r:id="rId17"/>
+    <p:sldId id="262" r:id="rId18"/>
   </p:sldIdLst>
   <p:sldSz cx="12192000" cy="6858000"/>
   <p:notesSz cx="6858000" cy="9144000"/>
@@ -132,10 +130,8 @@
             <p14:sldId id="1555"/>
             <p14:sldId id="1566"/>
             <p14:sldId id="1934"/>
+            <p14:sldId id="1575"/>
             <p14:sldId id="1571"/>
-            <p14:sldId id="1621"/>
-            <p14:sldId id="1560"/>
-            <p14:sldId id="1575"/>
             <p14:sldId id="1941"/>
             <p14:sldId id="1943"/>
             <p14:sldId id="1947"/>
@@ -236,7 +232,7 @@
           <a:p>
             <a:fld id="{18438622-0837-4E9E-A16C-0B0206CE676E}" type="datetimeFigureOut">
               <a:rPr lang="en-US" smtClean="0"/>
-              <a:t>9/5/19</a:t>
+              <a:t>9/6/19</a:t>
             </a:fld>
             <a:endParaRPr lang="en-US"/>
           </a:p>
@@ -652,7 +648,7 @@
           <a:p>
             <a:fld id="{E0AE778D-2A57-4226-B72B-26EA3CA60131}" type="slidenum">
               <a:rPr lang="en-US" smtClean="0"/>
-              <a:t>12</a:t>
+              <a:t>11</a:t>
             </a:fld>
             <a:endParaRPr lang="en-US"/>
           </a:p>
@@ -661,7 +657,7 @@
     </p:spTree>
     <p:extLst>
       <p:ext uri="{BB962C8B-B14F-4D97-AF65-F5344CB8AC3E}">
-        <p14:creationId xmlns:p14="http://schemas.microsoft.com/office/powerpoint/2010/main" val="3533383614"/>
+        <p14:creationId xmlns:p14="http://schemas.microsoft.com/office/powerpoint/2010/main" val="428488720"/>
       </p:ext>
     </p:extLst>
   </p:cSld>
@@ -736,7 +732,7 @@
           <a:p>
             <a:fld id="{E0AE778D-2A57-4226-B72B-26EA3CA60131}" type="slidenum">
               <a:rPr lang="en-US" smtClean="0"/>
-              <a:t>13</a:t>
+              <a:t>12</a:t>
             </a:fld>
             <a:endParaRPr lang="en-US"/>
           </a:p>
@@ -745,7 +741,7 @@
     </p:spTree>
     <p:extLst>
       <p:ext uri="{BB962C8B-B14F-4D97-AF65-F5344CB8AC3E}">
-        <p14:creationId xmlns:p14="http://schemas.microsoft.com/office/powerpoint/2010/main" val="428488720"/>
+        <p14:creationId xmlns:p14="http://schemas.microsoft.com/office/powerpoint/2010/main" val="1182493613"/>
       </p:ext>
     </p:extLst>
   </p:cSld>
@@ -820,7 +816,7 @@
           <a:p>
             <a:fld id="{E0AE778D-2A57-4226-B72B-26EA3CA60131}" type="slidenum">
               <a:rPr lang="en-US" smtClean="0"/>
-              <a:t>14</a:t>
+              <a:t>13</a:t>
             </a:fld>
             <a:endParaRPr lang="en-US"/>
           </a:p>
@@ -829,7 +825,7 @@
     </p:spTree>
     <p:extLst>
       <p:ext uri="{BB962C8B-B14F-4D97-AF65-F5344CB8AC3E}">
-        <p14:creationId xmlns:p14="http://schemas.microsoft.com/office/powerpoint/2010/main" val="1182493613"/>
+        <p14:creationId xmlns:p14="http://schemas.microsoft.com/office/powerpoint/2010/main" val="1117941490"/>
       </p:ext>
     </p:extLst>
   </p:cSld>
@@ -904,91 +900,7 @@
           <a:p>
             <a:fld id="{E0AE778D-2A57-4226-B72B-26EA3CA60131}" type="slidenum">
               <a:rPr lang="en-US" smtClean="0"/>
-              <a:t>15</a:t>
-            </a:fld>
-            <a:endParaRPr lang="en-US"/>
-          </a:p>
-        </p:txBody>
-      </p:sp>
-    </p:spTree>
-    <p:extLst>
-      <p:ext uri="{BB962C8B-B14F-4D97-AF65-F5344CB8AC3E}">
-        <p14:creationId xmlns:p14="http://schemas.microsoft.com/office/powerpoint/2010/main" val="1117941490"/>
-      </p:ext>
-    </p:extLst>
-  </p:cSld>
-  <p:clrMapOvr>
-    <a:masterClrMapping/>
-  </p:clrMapOvr>
-</p:notes>
-</file>
-
-<file path=ppt/notesSlides/notesSlide14.xml><?xml version="1.0" encoding="utf-8"?>
-<p:notes xmlns:a="http://schemas.openxmlformats.org/drawingml/2006/main" xmlns:r="http://schemas.openxmlformats.org/officeDocument/2006/relationships" xmlns:p="http://schemas.openxmlformats.org/presentationml/2006/main">
-  <p:cSld>
-    <p:spTree>
-      <p:nvGrpSpPr>
-        <p:cNvPr id="1" name=""/>
-        <p:cNvGrpSpPr/>
-        <p:nvPr/>
-      </p:nvGrpSpPr>
-      <p:grpSpPr>
-        <a:xfrm>
-          <a:off x="0" y="0"/>
-          <a:ext cx="0" cy="0"/>
-          <a:chOff x="0" y="0"/>
-          <a:chExt cx="0" cy="0"/>
-        </a:xfrm>
-      </p:grpSpPr>
-      <p:sp>
-        <p:nvSpPr>
-          <p:cNvPr id="2" name="Slide Image Placeholder 1"/>
-          <p:cNvSpPr>
-            <a:spLocks noGrp="1" noRot="1" noChangeAspect="1"/>
-          </p:cNvSpPr>
-          <p:nvPr>
-            <p:ph type="sldImg"/>
-          </p:nvPr>
-        </p:nvSpPr>
-        <p:spPr/>
-      </p:sp>
-      <p:sp>
-        <p:nvSpPr>
-          <p:cNvPr id="3" name="Notes Placeholder 2"/>
-          <p:cNvSpPr>
-            <a:spLocks noGrp="1"/>
-          </p:cNvSpPr>
-          <p:nvPr>
-            <p:ph type="body" idx="1"/>
-          </p:nvPr>
-        </p:nvSpPr>
-        <p:spPr/>
-        <p:txBody>
-          <a:bodyPr/>
-          <a:lstStyle/>
-          <a:p>
-            <a:endParaRPr lang="en-US"/>
-          </a:p>
-        </p:txBody>
-      </p:sp>
-      <p:sp>
-        <p:nvSpPr>
-          <p:cNvPr id="4" name="Slide Number Placeholder 3"/>
-          <p:cNvSpPr>
-            <a:spLocks noGrp="1"/>
-          </p:cNvSpPr>
-          <p:nvPr>
-            <p:ph type="sldNum" sz="quarter" idx="10"/>
-          </p:nvPr>
-        </p:nvSpPr>
-        <p:spPr/>
-        <p:txBody>
-          <a:bodyPr/>
-          <a:lstStyle/>
-          <a:p>
-            <a:fld id="{E0AE778D-2A57-4226-B72B-26EA3CA60131}" type="slidenum">
-              <a:rPr lang="en-US" smtClean="0"/>
-              <a:t>16</a:t>
+              <a:t>14</a:t>
             </a:fld>
             <a:endParaRPr lang="en-US"/>
           </a:p>
@@ -1114,7 +1026,7 @@
                   <a:prstClr val="black"/>
                 </a:solidFill>
               </a:rPr>
-              <a:t>9/5/19 7:17 PM</a:t>
+              <a:t>9/6/19 9:16 AM</a:t>
             </a:fld>
             <a:endParaRPr lang="en-US">
               <a:solidFill>
@@ -1460,7 +1372,7 @@
                 <a:tabLst/>
                 <a:defRPr/>
               </a:pPr>
-              <a:t>9/5/19 6:06 PM</a:t>
+              <a:t>9/6/19 9:16 AM</a:t>
             </a:fld>
             <a:endParaRPr kumimoji="0" lang="en-US" sz="1800" b="0" i="0" u="none" strike="noStrike" kern="0" cap="none" spc="0" normalizeH="0" baseline="0" noProof="0" dirty="0">
               <a:ln>
@@ -1756,7 +1668,7 @@
                   <a:prstClr val="black"/>
                 </a:solidFill>
               </a:rPr>
-              <a:t>9/5/19 6:06 PM</a:t>
+              <a:t>9/6/19 9:16 AM</a:t>
             </a:fld>
             <a:endParaRPr lang="en-US">
               <a:solidFill>
@@ -1898,6 +1810,72 @@
           <a:bodyPr/>
           <a:lstStyle/>
           <a:p>
+            <a:endParaRPr lang="en-US" dirty="0"/>
+          </a:p>
+        </p:txBody>
+      </p:sp>
+    </p:spTree>
+    <p:extLst>
+      <p:ext uri="{BB962C8B-B14F-4D97-AF65-F5344CB8AC3E}">
+        <p14:creationId xmlns:p14="http://schemas.microsoft.com/office/powerpoint/2010/main" val="3009288244"/>
+      </p:ext>
+    </p:extLst>
+  </p:cSld>
+  <p:clrMapOvr>
+    <a:masterClrMapping/>
+  </p:clrMapOvr>
+</p:notes>
+</file>
+
+<file path=ppt/notesSlides/notesSlide7.xml><?xml version="1.0" encoding="utf-8"?>
+<p:notes xmlns:a="http://schemas.openxmlformats.org/drawingml/2006/main" xmlns:r="http://schemas.openxmlformats.org/officeDocument/2006/relationships" xmlns:p="http://schemas.openxmlformats.org/presentationml/2006/main">
+  <p:cSld>
+    <p:spTree>
+      <p:nvGrpSpPr>
+        <p:cNvPr id="1" name=""/>
+        <p:cNvGrpSpPr/>
+        <p:nvPr/>
+      </p:nvGrpSpPr>
+      <p:grpSpPr>
+        <a:xfrm>
+          <a:off x="0" y="0"/>
+          <a:ext cx="0" cy="0"/>
+          <a:chOff x="0" y="0"/>
+          <a:chExt cx="0" cy="0"/>
+        </a:xfrm>
+      </p:grpSpPr>
+      <p:sp>
+        <p:nvSpPr>
+          <p:cNvPr id="2" name="Slide Image Placeholder 1"/>
+          <p:cNvSpPr>
+            <a:spLocks noGrp="1" noRot="1" noChangeAspect="1"/>
+          </p:cNvSpPr>
+          <p:nvPr>
+            <p:ph type="sldImg"/>
+          </p:nvPr>
+        </p:nvSpPr>
+        <p:spPr>
+          <a:xfrm>
+            <a:off x="381000" y="685800"/>
+            <a:ext cx="6096000" cy="3429000"/>
+          </a:xfrm>
+        </p:spPr>
+      </p:sp>
+      <p:sp>
+        <p:nvSpPr>
+          <p:cNvPr id="3" name="Notes Placeholder 2"/>
+          <p:cNvSpPr>
+            <a:spLocks noGrp="1"/>
+          </p:cNvSpPr>
+          <p:nvPr>
+            <p:ph type="body" idx="1"/>
+          </p:nvPr>
+        </p:nvSpPr>
+        <p:spPr/>
+        <p:txBody>
+          <a:bodyPr/>
+          <a:lstStyle/>
+          <a:p>
             <a:pPr lvl="0"/>
             <a:endParaRPr lang="en-US" sz="1200" u="none" strike="noStrike" kern="1200" dirty="0">
               <a:solidFill>
@@ -1983,7 +1961,7 @@
                 <a:tabLst/>
                 <a:defRPr/>
               </a:pPr>
-              <a:t>6</a:t>
+              <a:t>7</a:t>
             </a:fld>
             <a:endParaRPr kumimoji="0" lang="en-US" sz="1800" b="0" i="0" u="none" strike="noStrike" kern="0" cap="none" spc="0" normalizeH="0" baseline="0" noProof="0">
               <a:ln>
@@ -2015,7 +1993,7 @@
 </p:notes>
 </file>
 
-<file path=ppt/notesSlides/notesSlide7.xml><?xml version="1.0" encoding="utf-8"?>
+<file path=ppt/notesSlides/notesSlide8.xml><?xml version="1.0" encoding="utf-8"?>
 <p:notes xmlns:a="http://schemas.openxmlformats.org/drawingml/2006/main" xmlns:r="http://schemas.openxmlformats.org/officeDocument/2006/relationships" xmlns:p="http://schemas.openxmlformats.org/presentationml/2006/main">
   <p:cSld>
     <p:spTree>
@@ -2070,7 +2048,7 @@
             <a:spLocks noGrp="1"/>
           </p:cNvSpPr>
           <p:nvPr>
-            <p:ph type="hdr" sz="quarter" idx="10"/>
+            <p:ph type="hdr" sz="quarter"/>
           </p:nvPr>
         </p:nvSpPr>
         <p:spPr/>
@@ -2078,37 +2056,7 @@
           <a:bodyPr/>
           <a:lstStyle/>
           <a:p>
-            <a:pPr marL="0" marR="0" lvl="0" indent="0" algn="l" defTabSz="914400" rtl="0" eaLnBrk="1" fontAlgn="auto" latinLnBrk="0" hangingPunct="1">
-              <a:lnSpc>
-                <a:spcPct val="100000"/>
-              </a:lnSpc>
-              <a:spcBef>
-                <a:spcPts val="0"/>
-              </a:spcBef>
-              <a:spcAft>
-                <a:spcPts val="0"/>
-              </a:spcAft>
-              <a:buClrTx/>
-              <a:buSzTx/>
-              <a:buFontTx/>
-              <a:buNone/>
-              <a:tabLst/>
-              <a:defRPr/>
-            </a:pPr>
-            <a:endParaRPr kumimoji="0" lang="en-US" sz="1800" b="0" i="0" u="none" strike="noStrike" kern="0" cap="none" spc="0" normalizeH="0" baseline="0" noProof="0" dirty="0">
-              <a:ln>
-                <a:noFill/>
-              </a:ln>
-              <a:solidFill>
-                <a:sysClr val="windowText" lastClr="000000"/>
-              </a:solidFill>
-              <a:effectLst/>
-              <a:uLnTx/>
-              <a:uFillTx/>
-              <a:latin typeface="Segoe UI" pitchFamily="34" charset="0"/>
-              <a:ea typeface="+mn-ea"/>
-              <a:cs typeface="+mn-cs"/>
-            </a:endParaRPr>
+            <a:endParaRPr lang="en-US" dirty="0"/>
           </a:p>
         </p:txBody>
       </p:sp>
@@ -2119,7 +2067,7 @@
             <a:spLocks noGrp="1"/>
           </p:cNvSpPr>
           <p:nvPr>
-            <p:ph type="ftr" sz="quarter" idx="11"/>
+            <p:ph type="ftr" sz="quarter" idx="4"/>
           </p:nvPr>
         </p:nvSpPr>
         <p:spPr/>
@@ -2127,28 +2075,9 @@
           <a:bodyPr/>
           <a:lstStyle/>
           <a:p>
-            <a:pPr marL="0" marR="0" lvl="0" indent="0" algn="l" defTabSz="914099" rtl="0" eaLnBrk="0" fontAlgn="auto" latinLnBrk="0" hangingPunct="0">
-              <a:lnSpc>
-                <a:spcPct val="100000"/>
-              </a:lnSpc>
-              <a:spcBef>
-                <a:spcPts val="0"/>
-              </a:spcBef>
-              <a:spcAft>
-                <a:spcPts val="0"/>
-              </a:spcAft>
-              <a:buClrTx/>
-              <a:buSzTx/>
-              <a:buFontTx/>
-              <a:buNone/>
-              <a:tabLst/>
-              <a:defRPr/>
-            </a:pPr>
+            <a:pPr defTabSz="914099" eaLnBrk="0" hangingPunct="0"/>
             <a:r>
-              <a:rPr kumimoji="0" lang="en-US" sz="400" b="0" i="0" u="none" strike="noStrike" kern="0" cap="none" spc="0" normalizeH="0" baseline="0" noProof="0">
-                <a:ln>
-                  <a:noFill/>
-                </a:ln>
+              <a:rPr lang="en-US" sz="400">
                 <a:gradFill>
                   <a:gsLst>
                     <a:gs pos="0">
@@ -2160,19 +2089,13 @@
                   </a:gsLst>
                   <a:lin ang="5400000" scaled="0"/>
                 </a:gradFill>
-                <a:effectLst/>
-                <a:uLnTx/>
-                <a:uFillTx/>
                 <a:latin typeface="Segoe UI" pitchFamily="34" charset="0"/>
                 <a:ea typeface="Segoe UI" pitchFamily="34" charset="0"/>
                 <a:cs typeface="Segoe UI" pitchFamily="34" charset="0"/>
               </a:rPr>
               <a:t>© Microsoft Corporation. All rights reserved. MICROSOFT MAKES NO WARRANTIES, EXPRESS, IMPLIED OR STATUTORY, AS TO THE INFORMATION IN THIS PRESENTATION.</a:t>
             </a:r>
-            <a:endParaRPr kumimoji="0" lang="en-US" sz="400" b="0" i="0" u="none" strike="noStrike" kern="0" cap="none" spc="0" normalizeH="0" baseline="0" noProof="0" dirty="0">
-              <a:ln>
-                <a:noFill/>
-              </a:ln>
+            <a:endParaRPr lang="en-US" sz="400" dirty="0">
               <a:gradFill>
                 <a:gsLst>
                   <a:gs pos="0">
@@ -2184,9 +2107,6 @@
                 </a:gsLst>
                 <a:lin ang="5400000" scaled="0"/>
               </a:gradFill>
-              <a:effectLst/>
-              <a:uLnTx/>
-              <a:uFillTx/>
               <a:latin typeface="Segoe UI" pitchFamily="34" charset="0"/>
               <a:ea typeface="Segoe UI" pitchFamily="34" charset="0"/>
               <a:cs typeface="Segoe UI" pitchFamily="34" charset="0"/>
@@ -2201,7 +2121,7 @@
             <a:spLocks noGrp="1"/>
           </p:cNvSpPr>
           <p:nvPr>
-            <p:ph type="dt" idx="12"/>
+            <p:ph type="dt" idx="1"/>
           </p:nvPr>
         </p:nvSpPr>
         <p:spPr/>
@@ -2209,71 +2129,11 @@
           <a:bodyPr/>
           <a:lstStyle/>
           <a:p>
-            <a:pPr marL="0" marR="0" lvl="0" indent="0" algn="r" defTabSz="914400" rtl="0" eaLnBrk="1" fontAlgn="auto" latinLnBrk="0" hangingPunct="1">
-              <a:lnSpc>
-                <a:spcPct val="100000"/>
-              </a:lnSpc>
-              <a:spcBef>
-                <a:spcPts val="0"/>
-              </a:spcBef>
-              <a:spcAft>
-                <a:spcPts val="0"/>
-              </a:spcAft>
-              <a:buClrTx/>
-              <a:buSzTx/>
-              <a:buFontTx/>
-              <a:buNone/>
-              <a:tabLst/>
-              <a:defRPr/>
-            </a:pPr>
-            <a:fld id="{35A2D088-BDBD-41A5-ADCE-5C6A4DC08057}" type="datetime8">
-              <a:rPr kumimoji="0" lang="en-US" sz="1800" b="0" i="0" u="none" strike="noStrike" kern="0" cap="none" spc="0" normalizeH="0" baseline="0" noProof="0" smtClean="0">
-                <a:ln>
-                  <a:noFill/>
-                </a:ln>
-                <a:solidFill>
-                  <a:sysClr val="windowText" lastClr="000000"/>
-                </a:solidFill>
-                <a:effectLst/>
-                <a:uLnTx/>
-                <a:uFillTx/>
-                <a:latin typeface="Segoe UI" pitchFamily="34" charset="0"/>
-                <a:ea typeface="+mn-ea"/>
-                <a:cs typeface="+mn-cs"/>
-              </a:rPr>
-              <a:pPr marL="0" marR="0" lvl="0" indent="0" algn="r" defTabSz="914400" rtl="0" eaLnBrk="1" fontAlgn="auto" latinLnBrk="0" hangingPunct="1">
-                <a:lnSpc>
-                  <a:spcPct val="100000"/>
-                </a:lnSpc>
-                <a:spcBef>
-                  <a:spcPts val="0"/>
-                </a:spcBef>
-                <a:spcAft>
-                  <a:spcPts val="0"/>
-                </a:spcAft>
-                <a:buClrTx/>
-                <a:buSzTx/>
-                <a:buFontTx/>
-                <a:buNone/>
-                <a:tabLst/>
-                <a:defRPr/>
-              </a:pPr>
-              <a:t>9/5/19 6:06 PM</a:t>
+            <a:fld id="{D18B56EA-E28F-4F92-9F16-7A6F2501B303}" type="datetime8">
+              <a:rPr lang="en-US" smtClean="0"/>
+              <a:t>9/6/19 9:16 AM</a:t>
             </a:fld>
-            <a:endParaRPr kumimoji="0" lang="en-US" sz="1800" b="0" i="0" u="none" strike="noStrike" kern="0" cap="none" spc="0" normalizeH="0" baseline="0" noProof="0" dirty="0">
-              <a:ln>
-                <a:noFill/>
-              </a:ln>
-              <a:solidFill>
-                <a:sysClr val="windowText" lastClr="000000"/>
-              </a:solidFill>
-              <a:effectLst/>
-              <a:uLnTx/>
-              <a:uFillTx/>
-              <a:latin typeface="Segoe UI" pitchFamily="34" charset="0"/>
-              <a:ea typeface="+mn-ea"/>
-              <a:cs typeface="+mn-cs"/>
-            </a:endParaRPr>
+            <a:endParaRPr lang="en-US" dirty="0"/>
           </a:p>
         </p:txBody>
       </p:sp>
@@ -2284,7 +2144,7 @@
             <a:spLocks noGrp="1"/>
           </p:cNvSpPr>
           <p:nvPr>
-            <p:ph type="sldNum" sz="quarter" idx="13"/>
+            <p:ph type="sldNum" sz="quarter" idx="5"/>
           </p:nvPr>
         </p:nvSpPr>
         <p:spPr/>
@@ -2292,144 +2152,19 @@
           <a:bodyPr/>
           <a:lstStyle/>
           <a:p>
-            <a:pPr marL="0" marR="0" lvl="0" indent="0" algn="r" defTabSz="914400" rtl="0" eaLnBrk="1" fontAlgn="auto" latinLnBrk="0" hangingPunct="1">
-              <a:lnSpc>
-                <a:spcPct val="100000"/>
-              </a:lnSpc>
-              <a:spcBef>
-                <a:spcPts val="0"/>
-              </a:spcBef>
-              <a:spcAft>
-                <a:spcPts val="0"/>
-              </a:spcAft>
-              <a:buClrTx/>
-              <a:buSzTx/>
-              <a:buFontTx/>
-              <a:buNone/>
-              <a:tabLst/>
-              <a:defRPr/>
-            </a:pPr>
             <a:fld id="{B4008EB6-D09E-4580-8CD6-DDB14511944F}" type="slidenum">
-              <a:rPr kumimoji="0" lang="en-US" sz="1800" b="0" i="0" u="none" strike="noStrike" kern="0" cap="none" spc="0" normalizeH="0" baseline="0" noProof="0" smtClean="0">
-                <a:ln>
-                  <a:noFill/>
-                </a:ln>
-                <a:solidFill>
-                  <a:sysClr val="windowText" lastClr="000000"/>
-                </a:solidFill>
-                <a:effectLst/>
-                <a:uLnTx/>
-                <a:uFillTx/>
-                <a:latin typeface="Segoe UI" pitchFamily="34" charset="0"/>
-                <a:ea typeface="+mn-ea"/>
-                <a:cs typeface="+mn-cs"/>
-              </a:rPr>
-              <a:pPr marL="0" marR="0" lvl="0" indent="0" algn="r" defTabSz="914400" rtl="0" eaLnBrk="1" fontAlgn="auto" latinLnBrk="0" hangingPunct="1">
-                <a:lnSpc>
-                  <a:spcPct val="100000"/>
-                </a:lnSpc>
-                <a:spcBef>
-                  <a:spcPts val="0"/>
-                </a:spcBef>
-                <a:spcAft>
-                  <a:spcPts val="0"/>
-                </a:spcAft>
-                <a:buClrTx/>
-                <a:buSzTx/>
-                <a:buFontTx/>
-                <a:buNone/>
-                <a:tabLst/>
-                <a:defRPr/>
-              </a:pPr>
+              <a:rPr lang="en-US" smtClean="0"/>
+              <a:pPr/>
               <a:t>8</a:t>
             </a:fld>
-            <a:endParaRPr kumimoji="0" lang="en-US" sz="1800" b="0" i="0" u="none" strike="noStrike" kern="0" cap="none" spc="0" normalizeH="0" baseline="0" noProof="0" dirty="0">
-              <a:ln>
-                <a:noFill/>
-              </a:ln>
-              <a:solidFill>
-                <a:sysClr val="windowText" lastClr="000000"/>
-              </a:solidFill>
-              <a:effectLst/>
-              <a:uLnTx/>
-              <a:uFillTx/>
-              <a:latin typeface="Segoe UI" pitchFamily="34" charset="0"/>
-              <a:ea typeface="+mn-ea"/>
-              <a:cs typeface="+mn-cs"/>
-            </a:endParaRPr>
+            <a:endParaRPr lang="en-US" dirty="0"/>
           </a:p>
         </p:txBody>
       </p:sp>
     </p:spTree>
     <p:extLst>
       <p:ext uri="{BB962C8B-B14F-4D97-AF65-F5344CB8AC3E}">
-        <p14:creationId xmlns:p14="http://schemas.microsoft.com/office/powerpoint/2010/main" val="3599080689"/>
-      </p:ext>
-    </p:extLst>
-  </p:cSld>
-  <p:clrMapOvr>
-    <a:masterClrMapping/>
-  </p:clrMapOvr>
-</p:notes>
-</file>
-
-<file path=ppt/notesSlides/notesSlide8.xml><?xml version="1.0" encoding="utf-8"?>
-<p:notes xmlns:a="http://schemas.openxmlformats.org/drawingml/2006/main" xmlns:r="http://schemas.openxmlformats.org/officeDocument/2006/relationships" xmlns:p="http://schemas.openxmlformats.org/presentationml/2006/main">
-  <p:cSld>
-    <p:spTree>
-      <p:nvGrpSpPr>
-        <p:cNvPr id="1" name=""/>
-        <p:cNvGrpSpPr/>
-        <p:nvPr/>
-      </p:nvGrpSpPr>
-      <p:grpSpPr>
-        <a:xfrm>
-          <a:off x="0" y="0"/>
-          <a:ext cx="0" cy="0"/>
-          <a:chOff x="0" y="0"/>
-          <a:chExt cx="0" cy="0"/>
-        </a:xfrm>
-      </p:grpSpPr>
-      <p:sp>
-        <p:nvSpPr>
-          <p:cNvPr id="2" name="Slide Image Placeholder 1"/>
-          <p:cNvSpPr>
-            <a:spLocks noGrp="1" noRot="1" noChangeAspect="1"/>
-          </p:cNvSpPr>
-          <p:nvPr>
-            <p:ph type="sldImg"/>
-          </p:nvPr>
-        </p:nvSpPr>
-        <p:spPr>
-          <a:xfrm>
-            <a:off x="381000" y="685800"/>
-            <a:ext cx="6096000" cy="3429000"/>
-          </a:xfrm>
-        </p:spPr>
-      </p:sp>
-      <p:sp>
-        <p:nvSpPr>
-          <p:cNvPr id="3" name="Notes Placeholder 2"/>
-          <p:cNvSpPr>
-            <a:spLocks noGrp="1"/>
-          </p:cNvSpPr>
-          <p:nvPr>
-            <p:ph type="body" idx="1"/>
-          </p:nvPr>
-        </p:nvSpPr>
-        <p:spPr/>
-        <p:txBody>
-          <a:bodyPr/>
-          <a:lstStyle/>
-          <a:p>
-            <a:endParaRPr lang="en-US" dirty="0"/>
-          </a:p>
-        </p:txBody>
-      </p:sp>
-    </p:spTree>
-    <p:extLst>
-      <p:ext uri="{BB962C8B-B14F-4D97-AF65-F5344CB8AC3E}">
-        <p14:creationId xmlns:p14="http://schemas.microsoft.com/office/powerpoint/2010/main" val="3009288244"/>
+        <p14:creationId xmlns:p14="http://schemas.microsoft.com/office/powerpoint/2010/main" val="285558070"/>
       </p:ext>
     </p:extLst>
   </p:cSld>
@@ -2483,18 +2218,18 @@
           <a:bodyPr/>
           <a:lstStyle/>
           <a:p>
-            <a:endParaRPr lang="en-US" dirty="0"/>
+            <a:endParaRPr lang="en-US"/>
           </a:p>
         </p:txBody>
       </p:sp>
       <p:sp>
         <p:nvSpPr>
-          <p:cNvPr id="4" name="Header Placeholder 3"/>
+          <p:cNvPr id="4" name="Slide Number Placeholder 3"/>
           <p:cNvSpPr>
             <a:spLocks noGrp="1"/>
           </p:cNvSpPr>
           <p:nvPr>
-            <p:ph type="hdr" sz="quarter"/>
+            <p:ph type="sldNum" sz="quarter" idx="10"/>
           </p:nvPr>
         </p:nvSpPr>
         <p:spPr/>
@@ -2502,115 +2237,18 @@
           <a:bodyPr/>
           <a:lstStyle/>
           <a:p>
-            <a:endParaRPr lang="en-US" dirty="0"/>
-          </a:p>
-        </p:txBody>
-      </p:sp>
-      <p:sp>
-        <p:nvSpPr>
-          <p:cNvPr id="5" name="Footer Placeholder 4"/>
-          <p:cNvSpPr>
-            <a:spLocks noGrp="1"/>
-          </p:cNvSpPr>
-          <p:nvPr>
-            <p:ph type="ftr" sz="quarter" idx="4"/>
-          </p:nvPr>
-        </p:nvSpPr>
-        <p:spPr/>
-        <p:txBody>
-          <a:bodyPr/>
-          <a:lstStyle/>
-          <a:p>
-            <a:pPr defTabSz="914099" eaLnBrk="0" hangingPunct="0"/>
-            <a:r>
-              <a:rPr lang="en-US" sz="400">
-                <a:gradFill>
-                  <a:gsLst>
-                    <a:gs pos="0">
-                      <a:prstClr val="black"/>
-                    </a:gs>
-                    <a:gs pos="100000">
-                      <a:prstClr val="black"/>
-                    </a:gs>
-                  </a:gsLst>
-                  <a:lin ang="5400000" scaled="0"/>
-                </a:gradFill>
-                <a:latin typeface="Segoe UI" pitchFamily="34" charset="0"/>
-                <a:ea typeface="Segoe UI" pitchFamily="34" charset="0"/>
-                <a:cs typeface="Segoe UI" pitchFamily="34" charset="0"/>
-              </a:rPr>
-              <a:t>© Microsoft Corporation. All rights reserved. MICROSOFT MAKES NO WARRANTIES, EXPRESS, IMPLIED OR STATUTORY, AS TO THE INFORMATION IN THIS PRESENTATION.</a:t>
-            </a:r>
-            <a:endParaRPr lang="en-US" sz="400" dirty="0">
-              <a:gradFill>
-                <a:gsLst>
-                  <a:gs pos="0">
-                    <a:prstClr val="black"/>
-                  </a:gs>
-                  <a:gs pos="100000">
-                    <a:prstClr val="black"/>
-                  </a:gs>
-                </a:gsLst>
-                <a:lin ang="5400000" scaled="0"/>
-              </a:gradFill>
-              <a:latin typeface="Segoe UI" pitchFamily="34" charset="0"/>
-              <a:ea typeface="Segoe UI" pitchFamily="34" charset="0"/>
-              <a:cs typeface="Segoe UI" pitchFamily="34" charset="0"/>
-            </a:endParaRPr>
-          </a:p>
-        </p:txBody>
-      </p:sp>
-      <p:sp>
-        <p:nvSpPr>
-          <p:cNvPr id="6" name="Date Placeholder 5"/>
-          <p:cNvSpPr>
-            <a:spLocks noGrp="1"/>
-          </p:cNvSpPr>
-          <p:nvPr>
-            <p:ph type="dt" idx="1"/>
-          </p:nvPr>
-        </p:nvSpPr>
-        <p:spPr/>
-        <p:txBody>
-          <a:bodyPr/>
-          <a:lstStyle/>
-          <a:p>
-            <a:fld id="{D18B56EA-E28F-4F92-9F16-7A6F2501B303}" type="datetime8">
+            <a:fld id="{E0AE778D-2A57-4226-B72B-26EA3CA60131}" type="slidenum">
               <a:rPr lang="en-US" smtClean="0"/>
-              <a:t>9/5/19 6:06 PM</a:t>
-            </a:fld>
-            <a:endParaRPr lang="en-US" dirty="0"/>
-          </a:p>
-        </p:txBody>
-      </p:sp>
-      <p:sp>
-        <p:nvSpPr>
-          <p:cNvPr id="7" name="Slide Number Placeholder 6"/>
-          <p:cNvSpPr>
-            <a:spLocks noGrp="1"/>
-          </p:cNvSpPr>
-          <p:nvPr>
-            <p:ph type="sldNum" sz="quarter" idx="5"/>
-          </p:nvPr>
-        </p:nvSpPr>
-        <p:spPr/>
-        <p:txBody>
-          <a:bodyPr/>
-          <a:lstStyle/>
-          <a:p>
-            <a:fld id="{B4008EB6-D09E-4580-8CD6-DDB14511944F}" type="slidenum">
-              <a:rPr lang="en-US" smtClean="0"/>
-              <a:pPr/>
               <a:t>10</a:t>
             </a:fld>
-            <a:endParaRPr lang="en-US" dirty="0"/>
+            <a:endParaRPr lang="en-US"/>
           </a:p>
         </p:txBody>
       </p:sp>
     </p:spTree>
     <p:extLst>
       <p:ext uri="{BB962C8B-B14F-4D97-AF65-F5344CB8AC3E}">
-        <p14:creationId xmlns:p14="http://schemas.microsoft.com/office/powerpoint/2010/main" val="285558070"/>
+        <p14:creationId xmlns:p14="http://schemas.microsoft.com/office/powerpoint/2010/main" val="3533383614"/>
       </p:ext>
     </p:extLst>
   </p:cSld>
@@ -3729,90 +3367,6 @@
 
 <file path=ppt/slideLayouts/slideLayout16.xml><?xml version="1.0" encoding="utf-8"?>
 <p:sldLayout xmlns:a="http://schemas.openxmlformats.org/drawingml/2006/main" xmlns:r="http://schemas.openxmlformats.org/officeDocument/2006/relationships" xmlns:p="http://schemas.openxmlformats.org/presentationml/2006/main" userDrawn="1">
-  <p:cSld name="Section Title Accent Color 1">
-    <p:bg>
-      <p:bgPr>
-        <a:solidFill>
-          <a:schemeClr val="accent1"/>
-        </a:solidFill>
-        <a:effectLst/>
-      </p:bgPr>
-    </p:bg>
-    <p:spTree>
-      <p:nvGrpSpPr>
-        <p:cNvPr id="1" name=""/>
-        <p:cNvGrpSpPr/>
-        <p:nvPr/>
-      </p:nvGrpSpPr>
-      <p:grpSpPr>
-        <a:xfrm>
-          <a:off x="0" y="0"/>
-          <a:ext cx="0" cy="0"/>
-          <a:chOff x="0" y="0"/>
-          <a:chExt cx="0" cy="0"/>
-        </a:xfrm>
-      </p:grpSpPr>
-      <p:sp>
-        <p:nvSpPr>
-          <p:cNvPr id="2" name="Title 1"/>
-          <p:cNvSpPr>
-            <a:spLocks noGrp="1"/>
-          </p:cNvSpPr>
-          <p:nvPr>
-            <p:ph type="title" hasCustomPrompt="1"/>
-          </p:nvPr>
-        </p:nvSpPr>
-        <p:spPr>
-          <a:xfrm>
-            <a:off x="269239" y="2084172"/>
-            <a:ext cx="11653523" cy="1158793"/>
-          </a:xfrm>
-          <a:noFill/>
-        </p:spPr>
-        <p:txBody>
-          <a:bodyPr tIns="91440" bIns="91440" anchor="t" anchorCtr="0">
-            <a:spAutoFit/>
-          </a:bodyPr>
-          <a:lstStyle>
-            <a:lvl1pPr>
-              <a:defRPr sz="7058" spc="-98" baseline="0">
-                <a:gradFill>
-                  <a:gsLst>
-                    <a:gs pos="100000">
-                      <a:schemeClr val="tx1"/>
-                    </a:gs>
-                    <a:gs pos="0">
-                      <a:schemeClr val="tx1"/>
-                    </a:gs>
-                  </a:gsLst>
-                  <a:lin ang="5400000" scaled="0"/>
-                </a:gradFill>
-              </a:defRPr>
-            </a:lvl1pPr>
-          </a:lstStyle>
-          <a:p>
-            <a:r>
-              <a:rPr lang="en-US" dirty="0"/>
-              <a:t>Section title</a:t>
-            </a:r>
-          </a:p>
-        </p:txBody>
-      </p:sp>
-    </p:spTree>
-    <p:extLst>
-      <p:ext uri="{BB962C8B-B14F-4D97-AF65-F5344CB8AC3E}">
-        <p14:creationId xmlns:p14="http://schemas.microsoft.com/office/powerpoint/2010/main" val="2403419867"/>
-      </p:ext>
-    </p:extLst>
-  </p:cSld>
-  <p:clrMapOvr>
-    <a:overrideClrMapping bg1="dk1" tx1="lt1" bg2="dk2" tx2="lt2" accent1="accent1" accent2="accent2" accent3="accent3" accent4="accent4" accent5="accent5" accent6="accent6" hlink="hlink" folHlink="folHlink"/>
-  </p:clrMapOvr>
-</p:sldLayout>
-</file>
-
-<file path=ppt/slideLayouts/slideLayout17.xml><?xml version="1.0" encoding="utf-8"?>
-<p:sldLayout xmlns:a="http://schemas.openxmlformats.org/drawingml/2006/main" xmlns:r="http://schemas.openxmlformats.org/officeDocument/2006/relationships" xmlns:p="http://schemas.openxmlformats.org/presentationml/2006/main" userDrawn="1">
   <p:cSld name="Closing logo slide">
     <p:bg>
       <p:bgPr>
@@ -3849,7 +3403,7 @@
 </p:sldLayout>
 </file>
 
-<file path=ppt/slideLayouts/slideLayout18.xml><?xml version="1.0" encoding="utf-8"?>
+<file path=ppt/slideLayouts/slideLayout17.xml><?xml version="1.0" encoding="utf-8"?>
 <p:sldLayout xmlns:a="http://schemas.openxmlformats.org/drawingml/2006/main" xmlns:r="http://schemas.openxmlformats.org/officeDocument/2006/relationships" xmlns:p="http://schemas.openxmlformats.org/presentationml/2006/main" userDrawn="1">
   <p:cSld name="3_Demo slide">
     <p:bg>
@@ -7046,9 +6600,8 @@
     <p:sldLayoutId id="2147483728" r:id="rId13"/>
     <p:sldLayoutId id="2147483726" r:id="rId14"/>
     <p:sldLayoutId id="2147483754" r:id="rId15"/>
-    <p:sldLayoutId id="2147483755" r:id="rId16"/>
-    <p:sldLayoutId id="2147483756" r:id="rId17"/>
-    <p:sldLayoutId id="2147483759" r:id="rId18"/>
+    <p:sldLayoutId id="2147483756" r:id="rId16"/>
+    <p:sldLayoutId id="2147483759" r:id="rId17"/>
   </p:sldLayoutIdLst>
   <p:txStyles>
     <p:titleStyle>
@@ -7616,473 +7169,6 @@
           <a:chExt cx="0" cy="0"/>
         </a:xfrm>
       </p:grpSpPr>
-      <p:sp>
-        <p:nvSpPr>
-          <p:cNvPr id="2" name="Title 1">
-            <a:extLst>
-              <a:ext uri="{FF2B5EF4-FFF2-40B4-BE49-F238E27FC236}">
-                <a16:creationId xmlns:a16="http://schemas.microsoft.com/office/drawing/2014/main" id="{1540FD78-B5E6-FE4A-8332-386F19518AFE}"/>
-              </a:ext>
-            </a:extLst>
-          </p:cNvPr>
-          <p:cNvSpPr>
-            <a:spLocks noGrp="1"/>
-          </p:cNvSpPr>
-          <p:nvPr>
-            <p:ph type="title"/>
-          </p:nvPr>
-        </p:nvSpPr>
-        <p:spPr/>
-        <p:txBody>
-          <a:bodyPr/>
-          <a:lstStyle/>
-          <a:p>
-            <a:r>
-              <a:rPr lang="en-US" dirty="0"/>
-              <a:t>Quick Review</a:t>
-            </a:r>
-          </a:p>
-        </p:txBody>
-      </p:sp>
-    </p:spTree>
-    <p:extLst>
-      <p:ext uri="{BB962C8B-B14F-4D97-AF65-F5344CB8AC3E}">
-        <p14:creationId xmlns:p14="http://schemas.microsoft.com/office/powerpoint/2010/main" val="2987184589"/>
-      </p:ext>
-    </p:extLst>
-  </p:cSld>
-  <p:clrMapOvr>
-    <a:masterClrMapping/>
-  </p:clrMapOvr>
-</p:sld>
-</file>
-
-<file path=ppt/slides/slide11.xml><?xml version="1.0" encoding="utf-8"?>
-<p:sld xmlns:a="http://schemas.openxmlformats.org/drawingml/2006/main" xmlns:r="http://schemas.openxmlformats.org/officeDocument/2006/relationships" xmlns:p="http://schemas.openxmlformats.org/presentationml/2006/main">
-  <p:cSld>
-    <p:spTree>
-      <p:nvGrpSpPr>
-        <p:cNvPr id="1" name=""/>
-        <p:cNvGrpSpPr/>
-        <p:nvPr/>
-      </p:nvGrpSpPr>
-      <p:grpSpPr>
-        <a:xfrm>
-          <a:off x="0" y="0"/>
-          <a:ext cx="0" cy="0"/>
-          <a:chOff x="0" y="0"/>
-          <a:chExt cx="0" cy="0"/>
-        </a:xfrm>
-      </p:grpSpPr>
-      <p:sp>
-        <p:nvSpPr>
-          <p:cNvPr id="2" name="Title 1">
-            <a:extLst>
-              <a:ext uri="{FF2B5EF4-FFF2-40B4-BE49-F238E27FC236}">
-                <a16:creationId xmlns:a16="http://schemas.microsoft.com/office/drawing/2014/main" id="{667DA6D6-13B1-434C-B9AA-70628C006786}"/>
-              </a:ext>
-            </a:extLst>
-          </p:cNvPr>
-          <p:cNvSpPr>
-            <a:spLocks noGrp="1"/>
-          </p:cNvSpPr>
-          <p:nvPr>
-            <p:ph type="title"/>
-          </p:nvPr>
-        </p:nvSpPr>
-        <p:spPr/>
-        <p:txBody>
-          <a:bodyPr/>
-          <a:lstStyle/>
-          <a:p>
-            <a:r>
-              <a:rPr lang="en-US" dirty="0"/>
-              <a:t>Xamarin</a:t>
-            </a:r>
-          </a:p>
-        </p:txBody>
-      </p:sp>
-      <p:sp>
-        <p:nvSpPr>
-          <p:cNvPr id="3" name="Text Placeholder 5">
-            <a:extLst>
-              <a:ext uri="{FF2B5EF4-FFF2-40B4-BE49-F238E27FC236}">
-                <a16:creationId xmlns:a16="http://schemas.microsoft.com/office/drawing/2014/main" id="{85E1F499-FD44-F14A-852E-5A905DF915C9}"/>
-              </a:ext>
-            </a:extLst>
-          </p:cNvPr>
-          <p:cNvSpPr txBox="1">
-            <a:spLocks/>
-          </p:cNvSpPr>
-          <p:nvPr/>
-        </p:nvSpPr>
-        <p:spPr>
-          <a:xfrm>
-            <a:off x="269240" y="1189495"/>
-            <a:ext cx="11655078" cy="1599150"/>
-          </a:xfrm>
-          <a:prstGeom prst="rect">
-            <a:avLst/>
-          </a:prstGeom>
-        </p:spPr>
-        <p:txBody>
-          <a:bodyPr/>
-          <a:lstStyle>
-            <a:lvl1pPr marL="228600" marR="0" indent="-228600" algn="l" defTabSz="932742" rtl="0" eaLnBrk="1" fontAlgn="auto" latinLnBrk="0" hangingPunct="1">
-              <a:lnSpc>
-                <a:spcPct val="90000"/>
-              </a:lnSpc>
-              <a:spcBef>
-                <a:spcPct val="20000"/>
-              </a:spcBef>
-              <a:spcAft>
-                <a:spcPts val="0"/>
-              </a:spcAft>
-              <a:buClrTx/>
-              <a:buSzPct val="90000"/>
-              <a:buFont typeface="Wingdings" panose="05000000000000000000" pitchFamily="2" charset="2"/>
-              <a:buChar char=""/>
-              <a:tabLst/>
-              <a:defRPr sz="3600" kern="1200" spc="0" baseline="0">
-                <a:gradFill>
-                  <a:gsLst>
-                    <a:gs pos="1250">
-                      <a:schemeClr val="tx1"/>
-                    </a:gs>
-                    <a:gs pos="100000">
-                      <a:schemeClr val="tx1"/>
-                    </a:gs>
-                  </a:gsLst>
-                  <a:lin ang="5400000" scaled="0"/>
-                </a:gradFill>
-                <a:latin typeface="+mj-lt"/>
-                <a:ea typeface="+mn-ea"/>
-                <a:cs typeface="+mn-cs"/>
-              </a:defRPr>
-            </a:lvl1pPr>
-            <a:lvl2pPr marL="457200" marR="0" indent="-228600" algn="l" defTabSz="932742" rtl="0" eaLnBrk="1" fontAlgn="auto" latinLnBrk="0" hangingPunct="1">
-              <a:lnSpc>
-                <a:spcPct val="90000"/>
-              </a:lnSpc>
-              <a:spcBef>
-                <a:spcPct val="20000"/>
-              </a:spcBef>
-              <a:spcAft>
-                <a:spcPts val="0"/>
-              </a:spcAft>
-              <a:buClrTx/>
-              <a:buSzPct val="90000"/>
-              <a:buFont typeface="Wingdings" panose="05000000000000000000" pitchFamily="2" charset="2"/>
-              <a:buChar char=""/>
-              <a:tabLst/>
-              <a:defRPr sz="2800" kern="1200" spc="0" baseline="0">
-                <a:gradFill>
-                  <a:gsLst>
-                    <a:gs pos="1250">
-                      <a:schemeClr val="tx1"/>
-                    </a:gs>
-                    <a:gs pos="100000">
-                      <a:schemeClr val="tx1"/>
-                    </a:gs>
-                  </a:gsLst>
-                  <a:lin ang="5400000" scaled="0"/>
-                </a:gradFill>
-                <a:latin typeface="+mn-lt"/>
-                <a:ea typeface="+mn-ea"/>
-                <a:cs typeface="+mn-cs"/>
-              </a:defRPr>
-            </a:lvl2pPr>
-            <a:lvl3pPr marL="685800" marR="0" indent="-228600" algn="l" defTabSz="932742" rtl="0" eaLnBrk="1" fontAlgn="auto" latinLnBrk="0" hangingPunct="1">
-              <a:lnSpc>
-                <a:spcPct val="90000"/>
-              </a:lnSpc>
-              <a:spcBef>
-                <a:spcPct val="20000"/>
-              </a:spcBef>
-              <a:spcAft>
-                <a:spcPts val="0"/>
-              </a:spcAft>
-              <a:buClrTx/>
-              <a:buSzPct val="90000"/>
-              <a:buFont typeface="Wingdings" panose="05000000000000000000" pitchFamily="2" charset="2"/>
-              <a:buChar char=""/>
-              <a:tabLst/>
-              <a:defRPr sz="2400" kern="1200" spc="0" baseline="0">
-                <a:gradFill>
-                  <a:gsLst>
-                    <a:gs pos="1250">
-                      <a:schemeClr val="tx1"/>
-                    </a:gs>
-                    <a:gs pos="100000">
-                      <a:schemeClr val="tx1"/>
-                    </a:gs>
-                  </a:gsLst>
-                  <a:lin ang="5400000" scaled="0"/>
-                </a:gradFill>
-                <a:latin typeface="+mn-lt"/>
-                <a:ea typeface="+mn-ea"/>
-                <a:cs typeface="+mn-cs"/>
-              </a:defRPr>
-            </a:lvl3pPr>
-            <a:lvl4pPr marL="914400" marR="0" indent="-228600" algn="l" defTabSz="932742" rtl="0" eaLnBrk="1" fontAlgn="auto" latinLnBrk="0" hangingPunct="1">
-              <a:lnSpc>
-                <a:spcPct val="90000"/>
-              </a:lnSpc>
-              <a:spcBef>
-                <a:spcPct val="20000"/>
-              </a:spcBef>
-              <a:spcAft>
-                <a:spcPts val="0"/>
-              </a:spcAft>
-              <a:buClrTx/>
-              <a:buSzPct val="90000"/>
-              <a:buFont typeface="Wingdings" panose="05000000000000000000" pitchFamily="2" charset="2"/>
-              <a:buChar char=""/>
-              <a:tabLst/>
-              <a:defRPr sz="2200" kern="1200" spc="0" baseline="0">
-                <a:gradFill>
-                  <a:gsLst>
-                    <a:gs pos="1250">
-                      <a:schemeClr val="tx1"/>
-                    </a:gs>
-                    <a:gs pos="100000">
-                      <a:schemeClr val="tx1"/>
-                    </a:gs>
-                  </a:gsLst>
-                  <a:lin ang="5400000" scaled="0"/>
-                </a:gradFill>
-                <a:latin typeface="+mn-lt"/>
-                <a:ea typeface="+mn-ea"/>
-                <a:cs typeface="+mn-cs"/>
-              </a:defRPr>
-            </a:lvl4pPr>
-            <a:lvl5pPr marL="1143000" marR="0" indent="-228600" algn="l" defTabSz="932742" rtl="0" eaLnBrk="1" fontAlgn="auto" latinLnBrk="0" hangingPunct="1">
-              <a:lnSpc>
-                <a:spcPct val="90000"/>
-              </a:lnSpc>
-              <a:spcBef>
-                <a:spcPct val="20000"/>
-              </a:spcBef>
-              <a:spcAft>
-                <a:spcPts val="0"/>
-              </a:spcAft>
-              <a:buClrTx/>
-              <a:buSzPct val="90000"/>
-              <a:buFont typeface="Wingdings" panose="05000000000000000000" pitchFamily="2" charset="2"/>
-              <a:buChar char=""/>
-              <a:tabLst/>
-              <a:defRPr sz="2200" kern="1200" spc="0" baseline="0">
-                <a:gradFill>
-                  <a:gsLst>
-                    <a:gs pos="1250">
-                      <a:schemeClr val="tx1"/>
-                    </a:gs>
-                    <a:gs pos="100000">
-                      <a:schemeClr val="tx1"/>
-                    </a:gs>
-                  </a:gsLst>
-                  <a:lin ang="5400000" scaled="0"/>
-                </a:gradFill>
-                <a:latin typeface="+mn-lt"/>
-                <a:ea typeface="+mn-ea"/>
-                <a:cs typeface="+mn-cs"/>
-              </a:defRPr>
-            </a:lvl5pPr>
-            <a:lvl6pPr marL="2565040" indent="-233186" algn="l" defTabSz="932742" rtl="0" eaLnBrk="1" latinLnBrk="0" hangingPunct="1">
-              <a:spcBef>
-                <a:spcPct val="20000"/>
-              </a:spcBef>
-              <a:buFont typeface="Arial" pitchFamily="34" charset="0"/>
-              <a:buChar char="•"/>
-              <a:defRPr sz="2000" kern="1200">
-                <a:solidFill>
-                  <a:schemeClr val="tx1"/>
-                </a:solidFill>
-                <a:latin typeface="+mn-lt"/>
-                <a:ea typeface="+mn-ea"/>
-                <a:cs typeface="+mn-cs"/>
-              </a:defRPr>
-            </a:lvl6pPr>
-            <a:lvl7pPr marL="3031412" indent="-233186" algn="l" defTabSz="932742" rtl="0" eaLnBrk="1" latinLnBrk="0" hangingPunct="1">
-              <a:spcBef>
-                <a:spcPct val="20000"/>
-              </a:spcBef>
-              <a:buFont typeface="Arial" pitchFamily="34" charset="0"/>
-              <a:buChar char="•"/>
-              <a:defRPr sz="2000" kern="1200">
-                <a:solidFill>
-                  <a:schemeClr val="tx1"/>
-                </a:solidFill>
-                <a:latin typeface="+mn-lt"/>
-                <a:ea typeface="+mn-ea"/>
-                <a:cs typeface="+mn-cs"/>
-              </a:defRPr>
-            </a:lvl7pPr>
-            <a:lvl8pPr marL="3497783" indent="-233186" algn="l" defTabSz="932742" rtl="0" eaLnBrk="1" latinLnBrk="0" hangingPunct="1">
-              <a:spcBef>
-                <a:spcPct val="20000"/>
-              </a:spcBef>
-              <a:buFont typeface="Arial" pitchFamily="34" charset="0"/>
-              <a:buChar char="•"/>
-              <a:defRPr sz="2000" kern="1200">
-                <a:solidFill>
-                  <a:schemeClr val="tx1"/>
-                </a:solidFill>
-                <a:latin typeface="+mn-lt"/>
-                <a:ea typeface="+mn-ea"/>
-                <a:cs typeface="+mn-cs"/>
-              </a:defRPr>
-            </a:lvl8pPr>
-            <a:lvl9pPr marL="3964155" indent="-233186" algn="l" defTabSz="932742" rtl="0" eaLnBrk="1" latinLnBrk="0" hangingPunct="1">
-              <a:spcBef>
-                <a:spcPct val="20000"/>
-              </a:spcBef>
-              <a:buFont typeface="Arial" pitchFamily="34" charset="0"/>
-              <a:buChar char="•"/>
-              <a:defRPr sz="2000" kern="1200">
-                <a:solidFill>
-                  <a:schemeClr val="tx1"/>
-                </a:solidFill>
-                <a:latin typeface="+mn-lt"/>
-                <a:ea typeface="+mn-ea"/>
-                <a:cs typeface="+mn-cs"/>
-              </a:defRPr>
-            </a:lvl9pPr>
-          </a:lstStyle>
-          <a:p>
-            <a:r>
-              <a:rPr lang="en-US" sz="3529" dirty="0">
-                <a:solidFill>
-                  <a:schemeClr val="tx1"/>
-                </a:solidFill>
-              </a:rPr>
-              <a:t>Native Mobile Apps in .NET</a:t>
-            </a:r>
-          </a:p>
-          <a:p>
-            <a:pPr lvl="1"/>
-            <a:r>
-              <a:rPr lang="en-US" sz="2729" dirty="0">
-                <a:solidFill>
-                  <a:schemeClr val="tx1"/>
-                </a:solidFill>
-              </a:rPr>
-              <a:t>Create native iOS apps</a:t>
-            </a:r>
-          </a:p>
-          <a:p>
-            <a:pPr lvl="1"/>
-            <a:r>
-              <a:rPr lang="en-US" sz="2729" dirty="0">
-                <a:solidFill>
-                  <a:schemeClr val="tx1"/>
-                </a:solidFill>
-              </a:rPr>
-              <a:t>Create native Android apps</a:t>
-            </a:r>
-          </a:p>
-          <a:p>
-            <a:r>
-              <a:rPr lang="en-US" sz="3529" dirty="0" err="1">
-                <a:solidFill>
-                  <a:schemeClr val="tx1"/>
-                </a:solidFill>
-              </a:rPr>
-              <a:t>Xamarin.Forms</a:t>
-            </a:r>
-            <a:endParaRPr lang="en-US" sz="3529" dirty="0">
-              <a:solidFill>
-                <a:schemeClr val="tx1"/>
-              </a:solidFill>
-            </a:endParaRPr>
-          </a:p>
-          <a:p>
-            <a:pPr lvl="1"/>
-            <a:r>
-              <a:rPr lang="en-US" sz="2729" dirty="0">
-                <a:solidFill>
-                  <a:schemeClr val="tx1"/>
-                </a:solidFill>
-              </a:rPr>
-              <a:t>Share UI Code</a:t>
-            </a:r>
-            <a:endParaRPr lang="en-US" sz="3529" dirty="0">
-              <a:solidFill>
-                <a:schemeClr val="tx1"/>
-              </a:solidFill>
-            </a:endParaRPr>
-          </a:p>
-          <a:p>
-            <a:r>
-              <a:rPr lang="en-US" sz="3530" dirty="0">
-                <a:solidFill>
-                  <a:schemeClr val="tx1"/>
-                </a:solidFill>
-              </a:rPr>
-              <a:t>Visual Studio</a:t>
-            </a:r>
-          </a:p>
-          <a:p>
-            <a:pPr lvl="1"/>
-            <a:r>
-              <a:rPr lang="en-US" sz="2729" dirty="0">
-                <a:solidFill>
-                  <a:schemeClr val="tx1"/>
-                </a:solidFill>
-              </a:rPr>
-              <a:t>Develop in Visual Studio (PC) </a:t>
-            </a:r>
-          </a:p>
-          <a:p>
-            <a:pPr lvl="1"/>
-            <a:r>
-              <a:rPr lang="en-US" sz="2729" dirty="0">
-                <a:solidFill>
-                  <a:schemeClr val="tx1"/>
-                </a:solidFill>
-              </a:rPr>
-              <a:t>Develop in Visual Studio for Mac</a:t>
-            </a:r>
-          </a:p>
-          <a:p>
-            <a:endParaRPr lang="en-US" sz="3529" dirty="0">
-              <a:solidFill>
-                <a:schemeClr val="tx1"/>
-              </a:solidFill>
-            </a:endParaRPr>
-          </a:p>
-        </p:txBody>
-      </p:sp>
-    </p:spTree>
-    <p:extLst>
-      <p:ext uri="{BB962C8B-B14F-4D97-AF65-F5344CB8AC3E}">
-        <p14:creationId xmlns:p14="http://schemas.microsoft.com/office/powerpoint/2010/main" val="346288692"/>
-      </p:ext>
-    </p:extLst>
-  </p:cSld>
-  <p:clrMapOvr>
-    <a:masterClrMapping/>
-  </p:clrMapOvr>
-</p:sld>
-</file>
-
-<file path=ppt/slides/slide12.xml><?xml version="1.0" encoding="utf-8"?>
-<p:sld xmlns:a="http://schemas.openxmlformats.org/drawingml/2006/main" xmlns:r="http://schemas.openxmlformats.org/officeDocument/2006/relationships" xmlns:p="http://schemas.openxmlformats.org/presentationml/2006/main">
-  <p:cSld>
-    <p:spTree>
-      <p:nvGrpSpPr>
-        <p:cNvPr id="1" name=""/>
-        <p:cNvGrpSpPr/>
-        <p:nvPr/>
-      </p:nvGrpSpPr>
-      <p:grpSpPr>
-        <a:xfrm>
-          <a:off x="0" y="0"/>
-          <a:ext cx="0" cy="0"/>
-          <a:chOff x="0" y="0"/>
-          <a:chExt cx="0" cy="0"/>
-        </a:xfrm>
-      </p:grpSpPr>
       <p:pic>
         <p:nvPicPr>
           <p:cNvPr id="2" name="Picture 1">
@@ -8126,7 +7212,7 @@
 </p:sld>
 </file>
 
-<file path=ppt/slides/slide13.xml><?xml version="1.0" encoding="utf-8"?>
+<file path=ppt/slides/slide11.xml><?xml version="1.0" encoding="utf-8"?>
 <p:sld xmlns:a="http://schemas.openxmlformats.org/drawingml/2006/main" xmlns:r="http://schemas.openxmlformats.org/officeDocument/2006/relationships" xmlns:p="http://schemas.openxmlformats.org/presentationml/2006/main" show="0">
   <p:cSld>
     <p:spTree>
@@ -8209,7 +7295,7 @@
 </p:sld>
 </file>
 
-<file path=ppt/slides/slide14.xml><?xml version="1.0" encoding="utf-8"?>
+<file path=ppt/slides/slide12.xml><?xml version="1.0" encoding="utf-8"?>
 <p:sld xmlns:a="http://schemas.openxmlformats.org/drawingml/2006/main" xmlns:r="http://schemas.openxmlformats.org/officeDocument/2006/relationships" xmlns:p="http://schemas.openxmlformats.org/presentationml/2006/main" show="0">
   <p:cSld>
     <p:spTree>
@@ -8264,7 +7350,7 @@
 </p:sld>
 </file>
 
-<file path=ppt/slides/slide15.xml><?xml version="1.0" encoding="utf-8"?>
+<file path=ppt/slides/slide13.xml><?xml version="1.0" encoding="utf-8"?>
 <p:sld xmlns:a="http://schemas.openxmlformats.org/drawingml/2006/main" xmlns:r="http://schemas.openxmlformats.org/officeDocument/2006/relationships" xmlns:p="http://schemas.openxmlformats.org/presentationml/2006/main" show="0">
   <p:cSld>
     <p:spTree>
@@ -8322,7 +7408,7 @@
 </p:sld>
 </file>
 
-<file path=ppt/slides/slide16.xml><?xml version="1.0" encoding="utf-8"?>
+<file path=ppt/slides/slide14.xml><?xml version="1.0" encoding="utf-8"?>
 <p:sld xmlns:a="http://schemas.openxmlformats.org/drawingml/2006/main" xmlns:r="http://schemas.openxmlformats.org/officeDocument/2006/relationships" xmlns:p="http://schemas.openxmlformats.org/presentationml/2006/main" show="0">
   <p:cSld>
     <p:spTree>
@@ -8413,7 +7499,7 @@
         </p:nvSpPr>
         <p:spPr>
           <a:xfrm>
-            <a:off x="150472" y="2467581"/>
+            <a:off x="230482" y="2536161"/>
             <a:ext cx="9641713" cy="1598028"/>
           </a:xfrm>
           <a:prstGeom prst="rect">
@@ -8458,14 +7544,8 @@
           </a:lstStyle>
           <a:p>
             <a:r>
-              <a:rPr lang="en-US" sz="4902" dirty="0"/>
-              <a:t>Creating iOS &amp; Android apps </a:t>
-            </a:r>
-          </a:p>
-          <a:p>
-            <a:r>
-              <a:rPr lang="en-US" sz="4902" dirty="0"/>
-              <a:t>in .NET Using Xamarin</a:t>
+              <a:rPr lang="en-US" sz="9600" dirty="0"/>
+              <a:t>Xamarin 101</a:t>
             </a:r>
           </a:p>
         </p:txBody>
@@ -10631,748 +9711,6 @@
 </file>
 
 <file path=ppt/slides/slide6.xml><?xml version="1.0" encoding="utf-8"?>
-<p:sld xmlns:a="http://schemas.openxmlformats.org/drawingml/2006/main" xmlns:r="http://schemas.openxmlformats.org/officeDocument/2006/relationships" xmlns:p="http://schemas.openxmlformats.org/presentationml/2006/main">
-  <p:cSld>
-    <p:spTree>
-      <p:nvGrpSpPr>
-        <p:cNvPr id="1" name=""/>
-        <p:cNvGrpSpPr/>
-        <p:nvPr/>
-      </p:nvGrpSpPr>
-      <p:grpSpPr>
-        <a:xfrm>
-          <a:off x="0" y="0"/>
-          <a:ext cx="0" cy="0"/>
-          <a:chOff x="0" y="0"/>
-          <a:chExt cx="0" cy="0"/>
-        </a:xfrm>
-      </p:grpSpPr>
-      <p:grpSp>
-        <p:nvGrpSpPr>
-          <p:cNvPr id="2" name="Group 1">
-            <a:extLst>
-              <a:ext uri="{FF2B5EF4-FFF2-40B4-BE49-F238E27FC236}">
-                <a16:creationId xmlns:a16="http://schemas.microsoft.com/office/drawing/2014/main" id="{DE94121D-A6DB-FA48-B29A-E0367F939463}"/>
-              </a:ext>
-            </a:extLst>
-          </p:cNvPr>
-          <p:cNvGrpSpPr/>
-          <p:nvPr/>
-        </p:nvGrpSpPr>
-        <p:grpSpPr>
-          <a:xfrm>
-            <a:off x="-2177857" y="1290110"/>
-            <a:ext cx="8279948" cy="4947503"/>
-            <a:chOff x="-2177857" y="1290110"/>
-            <a:chExt cx="8279948" cy="4947503"/>
-          </a:xfrm>
-        </p:grpSpPr>
-        <p:pic>
-          <p:nvPicPr>
-            <p:cNvPr id="11" name="Picture 10" descr="PC_FrontFrame.png"/>
-            <p:cNvPicPr>
-              <a:picLocks noChangeAspect="1"/>
-            </p:cNvPicPr>
-            <p:nvPr/>
-          </p:nvPicPr>
-          <p:blipFill>
-            <a:blip r:embed="rId3" cstate="email">
-              <a:extLst>
-                <a:ext uri="{28A0092B-C50C-407E-A947-70E740481C1C}">
-                  <a14:useLocalDpi xmlns:a14="http://schemas.microsoft.com/office/drawing/2010/main"/>
-                </a:ext>
-              </a:extLst>
-            </a:blip>
-            <a:stretch>
-              <a:fillRect/>
-            </a:stretch>
-          </p:blipFill>
-          <p:spPr>
-            <a:xfrm>
-              <a:off x="-2177857" y="1290110"/>
-              <a:ext cx="8279948" cy="4947503"/>
-            </a:xfrm>
-            <a:prstGeom prst="rect">
-              <a:avLst/>
-            </a:prstGeom>
-          </p:spPr>
-        </p:pic>
-        <p:pic>
-          <p:nvPicPr>
-            <p:cNvPr id="12" name="Picture 11"/>
-            <p:cNvPicPr>
-              <a:picLocks noChangeAspect="1"/>
-            </p:cNvPicPr>
-            <p:nvPr/>
-          </p:nvPicPr>
-          <p:blipFill>
-            <a:blip r:embed="rId4"/>
-            <a:stretch>
-              <a:fillRect/>
-            </a:stretch>
-          </p:blipFill>
-          <p:spPr>
-            <a:xfrm>
-              <a:off x="-1144727" y="1656126"/>
-              <a:ext cx="6203552" cy="3778135"/>
-            </a:xfrm>
-            <a:prstGeom prst="rect">
-              <a:avLst/>
-            </a:prstGeom>
-          </p:spPr>
-        </p:pic>
-      </p:grpSp>
-      <p:sp>
-        <p:nvSpPr>
-          <p:cNvPr id="3" name="Title 2"/>
-          <p:cNvSpPr>
-            <a:spLocks noGrp="1"/>
-          </p:cNvSpPr>
-          <p:nvPr>
-            <p:ph type="title"/>
-          </p:nvPr>
-        </p:nvSpPr>
-        <p:spPr>
-          <a:xfrm>
-            <a:off x="269241" y="289957"/>
-            <a:ext cx="11655840" cy="899537"/>
-          </a:xfrm>
-        </p:spPr>
-        <p:txBody>
-          <a:bodyPr/>
-          <a:lstStyle/>
-          <a:p>
-            <a:r>
-              <a:rPr lang="en-US" dirty="0">
-                <a:solidFill>
-                  <a:schemeClr val="tx1"/>
-                </a:solidFill>
-              </a:rPr>
-              <a:t>Visual Studio (PC)</a:t>
-            </a:r>
-          </a:p>
-        </p:txBody>
-      </p:sp>
-      <p:sp>
-        <p:nvSpPr>
-          <p:cNvPr id="15" name="Title 2"/>
-          <p:cNvSpPr txBox="1">
-            <a:spLocks/>
-          </p:cNvSpPr>
-          <p:nvPr/>
-        </p:nvSpPr>
-        <p:spPr>
-          <a:xfrm>
-            <a:off x="6311318" y="289957"/>
-            <a:ext cx="5657387" cy="899538"/>
-          </a:xfrm>
-          <a:prstGeom prst="rect">
-            <a:avLst/>
-          </a:prstGeom>
-        </p:spPr>
-        <p:txBody>
-          <a:bodyPr vert="horz" wrap="square" lIns="146284" tIns="91427" rIns="146284" bIns="91427" rtlCol="0" anchor="t">
-            <a:noAutofit/>
-          </a:bodyPr>
-          <a:lstStyle>
-            <a:lvl1pPr algn="l" defTabSz="914367" rtl="0" eaLnBrk="1" latinLnBrk="0" hangingPunct="1">
-              <a:lnSpc>
-                <a:spcPct val="90000"/>
-              </a:lnSpc>
-              <a:spcBef>
-                <a:spcPct val="0"/>
-              </a:spcBef>
-              <a:buNone/>
-              <a:defRPr lang="en-US" sz="4705" b="0" kern="1200" cap="none" spc="-100" baseline="0" dirty="0" smtClean="0">
-                <a:ln w="3175">
-                  <a:noFill/>
-                </a:ln>
-                <a:gradFill>
-                  <a:gsLst>
-                    <a:gs pos="1250">
-                      <a:schemeClr val="tx1"/>
-                    </a:gs>
-                    <a:gs pos="100000">
-                      <a:schemeClr val="tx1"/>
-                    </a:gs>
-                  </a:gsLst>
-                  <a:lin ang="5400000" scaled="0"/>
-                </a:gradFill>
-                <a:effectLst/>
-                <a:latin typeface="+mj-lt"/>
-                <a:ea typeface="+mn-ea"/>
-                <a:cs typeface="Segoe UI" pitchFamily="34" charset="0"/>
-              </a:defRPr>
-            </a:lvl1pPr>
-          </a:lstStyle>
-          <a:p>
-            <a:pPr defTabSz="457157">
-              <a:defRPr/>
-            </a:pPr>
-            <a:r>
-              <a:rPr lang="en-US" sz="4800" spc="-50" dirty="0">
-                <a:solidFill>
-                  <a:schemeClr val="tx1"/>
-                </a:solidFill>
-                <a:latin typeface="Segoe UI Light" panose="020B0502040204020203" pitchFamily="34" charset="0"/>
-                <a:ea typeface="Segoe UI" charset="0"/>
-                <a:cs typeface="Segoe UI" charset="0"/>
-              </a:rPr>
-              <a:t>Visual Studio for Mac</a:t>
-            </a:r>
-          </a:p>
-        </p:txBody>
-      </p:sp>
-      <p:pic>
-        <p:nvPicPr>
-          <p:cNvPr id="8" name="Picture 7" descr="A screenshot of a computer monitor&#10;&#10;Description automatically generated">
-            <a:extLst>
-              <a:ext uri="{FF2B5EF4-FFF2-40B4-BE49-F238E27FC236}">
-                <a16:creationId xmlns:a16="http://schemas.microsoft.com/office/drawing/2014/main" id="{78AF5D0E-6E54-9F42-A3C3-0AB0C21CEDB8}"/>
-              </a:ext>
-            </a:extLst>
-          </p:cNvPr>
-          <p:cNvPicPr>
-            <a:picLocks noChangeAspect="1"/>
-          </p:cNvPicPr>
-          <p:nvPr/>
-        </p:nvPicPr>
-        <p:blipFill>
-          <a:blip r:embed="rId5"/>
-          <a:stretch>
-            <a:fillRect/>
-          </a:stretch>
-        </p:blipFill>
-        <p:spPr>
-          <a:xfrm>
-            <a:off x="6850034" y="1189494"/>
-            <a:ext cx="8279948" cy="5128346"/>
-          </a:xfrm>
-          <a:prstGeom prst="rect">
-            <a:avLst/>
-          </a:prstGeom>
-        </p:spPr>
-      </p:pic>
-    </p:spTree>
-    <p:extLst>
-      <p:ext uri="{BB962C8B-B14F-4D97-AF65-F5344CB8AC3E}">
-        <p14:creationId xmlns:p14="http://schemas.microsoft.com/office/powerpoint/2010/main" val="137712924"/>
-      </p:ext>
-    </p:extLst>
-  </p:cSld>
-  <p:clrMapOvr>
-    <a:masterClrMapping/>
-  </p:clrMapOvr>
-</p:sld>
-</file>
-
-<file path=ppt/slides/slide7.xml><?xml version="1.0" encoding="utf-8"?>
-<p:sld xmlns:a="http://schemas.openxmlformats.org/drawingml/2006/main" xmlns:r="http://schemas.openxmlformats.org/officeDocument/2006/relationships" xmlns:p="http://schemas.openxmlformats.org/presentationml/2006/main">
-  <p:cSld>
-    <p:spTree>
-      <p:nvGrpSpPr>
-        <p:cNvPr id="1" name=""/>
-        <p:cNvGrpSpPr/>
-        <p:nvPr/>
-      </p:nvGrpSpPr>
-      <p:grpSpPr>
-        <a:xfrm>
-          <a:off x="0" y="0"/>
-          <a:ext cx="0" cy="0"/>
-          <a:chOff x="0" y="0"/>
-          <a:chExt cx="0" cy="0"/>
-        </a:xfrm>
-      </p:grpSpPr>
-      <p:sp>
-        <p:nvSpPr>
-          <p:cNvPr id="2" name="Title 1">
-            <a:extLst>
-              <a:ext uri="{FF2B5EF4-FFF2-40B4-BE49-F238E27FC236}">
-                <a16:creationId xmlns:a16="http://schemas.microsoft.com/office/drawing/2014/main" id="{FECA7E04-0272-4948-BC98-0F0D3CB87F02}"/>
-              </a:ext>
-            </a:extLst>
-          </p:cNvPr>
-          <p:cNvSpPr>
-            <a:spLocks noGrp="1"/>
-          </p:cNvSpPr>
-          <p:nvPr>
-            <p:ph type="title"/>
-          </p:nvPr>
-        </p:nvSpPr>
-        <p:spPr/>
-        <p:txBody>
-          <a:bodyPr/>
-          <a:lstStyle/>
-          <a:p>
-            <a:r>
-              <a:rPr lang="en-US" dirty="0"/>
-              <a:t>Open Source</a:t>
-            </a:r>
-          </a:p>
-        </p:txBody>
-      </p:sp>
-      <p:sp>
-        <p:nvSpPr>
-          <p:cNvPr id="9" name="Text Placeholder 2">
-            <a:extLst>
-              <a:ext uri="{FF2B5EF4-FFF2-40B4-BE49-F238E27FC236}">
-                <a16:creationId xmlns:a16="http://schemas.microsoft.com/office/drawing/2014/main" id="{225153FC-B999-DA42-8D39-CB75876932C7}"/>
-              </a:ext>
-            </a:extLst>
-          </p:cNvPr>
-          <p:cNvSpPr txBox="1">
-            <a:spLocks/>
-          </p:cNvSpPr>
-          <p:nvPr/>
-        </p:nvSpPr>
-        <p:spPr>
-          <a:xfrm>
-            <a:off x="269303" y="1187963"/>
-            <a:ext cx="11655078" cy="5376993"/>
-          </a:xfrm>
-          <a:prstGeom prst="rect">
-            <a:avLst/>
-          </a:prstGeom>
-        </p:spPr>
-        <p:txBody>
-          <a:bodyPr/>
-          <a:lstStyle>
-            <a:lvl1pPr marL="228600" marR="0" indent="-228600" algn="l" defTabSz="932742" rtl="0" eaLnBrk="1" fontAlgn="auto" latinLnBrk="0" hangingPunct="1">
-              <a:lnSpc>
-                <a:spcPct val="90000"/>
-              </a:lnSpc>
-              <a:spcBef>
-                <a:spcPct val="20000"/>
-              </a:spcBef>
-              <a:spcAft>
-                <a:spcPts val="0"/>
-              </a:spcAft>
-              <a:buClrTx/>
-              <a:buSzPct val="90000"/>
-              <a:buFont typeface="Wingdings" panose="05000000000000000000" pitchFamily="2" charset="2"/>
-              <a:buChar char=""/>
-              <a:tabLst/>
-              <a:defRPr sz="3600" kern="1200" spc="0" baseline="0">
-                <a:gradFill>
-                  <a:gsLst>
-                    <a:gs pos="1250">
-                      <a:schemeClr val="tx1"/>
-                    </a:gs>
-                    <a:gs pos="100000">
-                      <a:schemeClr val="tx1"/>
-                    </a:gs>
-                  </a:gsLst>
-                  <a:lin ang="5400000" scaled="0"/>
-                </a:gradFill>
-                <a:latin typeface="+mj-lt"/>
-                <a:ea typeface="+mn-ea"/>
-                <a:cs typeface="+mn-cs"/>
-              </a:defRPr>
-            </a:lvl1pPr>
-            <a:lvl2pPr marL="457200" marR="0" indent="-228600" algn="l" defTabSz="932742" rtl="0" eaLnBrk="1" fontAlgn="auto" latinLnBrk="0" hangingPunct="1">
-              <a:lnSpc>
-                <a:spcPct val="90000"/>
-              </a:lnSpc>
-              <a:spcBef>
-                <a:spcPct val="20000"/>
-              </a:spcBef>
-              <a:spcAft>
-                <a:spcPts val="0"/>
-              </a:spcAft>
-              <a:buClrTx/>
-              <a:buSzPct val="90000"/>
-              <a:buFont typeface="Wingdings" panose="05000000000000000000" pitchFamily="2" charset="2"/>
-              <a:buChar char=""/>
-              <a:tabLst/>
-              <a:defRPr sz="2800" kern="1200" spc="0" baseline="0">
-                <a:gradFill>
-                  <a:gsLst>
-                    <a:gs pos="1250">
-                      <a:schemeClr val="tx1"/>
-                    </a:gs>
-                    <a:gs pos="100000">
-                      <a:schemeClr val="tx1"/>
-                    </a:gs>
-                  </a:gsLst>
-                  <a:lin ang="5400000" scaled="0"/>
-                </a:gradFill>
-                <a:latin typeface="+mn-lt"/>
-                <a:ea typeface="+mn-ea"/>
-                <a:cs typeface="+mn-cs"/>
-              </a:defRPr>
-            </a:lvl2pPr>
-            <a:lvl3pPr marL="685800" marR="0" indent="-228600" algn="l" defTabSz="932742" rtl="0" eaLnBrk="1" fontAlgn="auto" latinLnBrk="0" hangingPunct="1">
-              <a:lnSpc>
-                <a:spcPct val="90000"/>
-              </a:lnSpc>
-              <a:spcBef>
-                <a:spcPct val="20000"/>
-              </a:spcBef>
-              <a:spcAft>
-                <a:spcPts val="0"/>
-              </a:spcAft>
-              <a:buClrTx/>
-              <a:buSzPct val="90000"/>
-              <a:buFont typeface="Wingdings" panose="05000000000000000000" pitchFamily="2" charset="2"/>
-              <a:buChar char=""/>
-              <a:tabLst/>
-              <a:defRPr sz="2400" kern="1200" spc="0" baseline="0">
-                <a:gradFill>
-                  <a:gsLst>
-                    <a:gs pos="1250">
-                      <a:schemeClr val="tx1"/>
-                    </a:gs>
-                    <a:gs pos="100000">
-                      <a:schemeClr val="tx1"/>
-                    </a:gs>
-                  </a:gsLst>
-                  <a:lin ang="5400000" scaled="0"/>
-                </a:gradFill>
-                <a:latin typeface="+mn-lt"/>
-                <a:ea typeface="+mn-ea"/>
-                <a:cs typeface="+mn-cs"/>
-              </a:defRPr>
-            </a:lvl3pPr>
-            <a:lvl4pPr marL="914400" marR="0" indent="-228600" algn="l" defTabSz="932742" rtl="0" eaLnBrk="1" fontAlgn="auto" latinLnBrk="0" hangingPunct="1">
-              <a:lnSpc>
-                <a:spcPct val="90000"/>
-              </a:lnSpc>
-              <a:spcBef>
-                <a:spcPct val="20000"/>
-              </a:spcBef>
-              <a:spcAft>
-                <a:spcPts val="0"/>
-              </a:spcAft>
-              <a:buClrTx/>
-              <a:buSzPct val="90000"/>
-              <a:buFont typeface="Wingdings" panose="05000000000000000000" pitchFamily="2" charset="2"/>
-              <a:buChar char=""/>
-              <a:tabLst/>
-              <a:defRPr sz="2200" kern="1200" spc="0" baseline="0">
-                <a:gradFill>
-                  <a:gsLst>
-                    <a:gs pos="1250">
-                      <a:schemeClr val="tx1"/>
-                    </a:gs>
-                    <a:gs pos="100000">
-                      <a:schemeClr val="tx1"/>
-                    </a:gs>
-                  </a:gsLst>
-                  <a:lin ang="5400000" scaled="0"/>
-                </a:gradFill>
-                <a:latin typeface="+mn-lt"/>
-                <a:ea typeface="+mn-ea"/>
-                <a:cs typeface="+mn-cs"/>
-              </a:defRPr>
-            </a:lvl4pPr>
-            <a:lvl5pPr marL="1143000" marR="0" indent="-228600" algn="l" defTabSz="932742" rtl="0" eaLnBrk="1" fontAlgn="auto" latinLnBrk="0" hangingPunct="1">
-              <a:lnSpc>
-                <a:spcPct val="90000"/>
-              </a:lnSpc>
-              <a:spcBef>
-                <a:spcPct val="20000"/>
-              </a:spcBef>
-              <a:spcAft>
-                <a:spcPts val="0"/>
-              </a:spcAft>
-              <a:buClrTx/>
-              <a:buSzPct val="90000"/>
-              <a:buFont typeface="Wingdings" panose="05000000000000000000" pitchFamily="2" charset="2"/>
-              <a:buChar char=""/>
-              <a:tabLst/>
-              <a:defRPr sz="2200" kern="1200" spc="0" baseline="0">
-                <a:gradFill>
-                  <a:gsLst>
-                    <a:gs pos="1250">
-                      <a:schemeClr val="tx1"/>
-                    </a:gs>
-                    <a:gs pos="100000">
-                      <a:schemeClr val="tx1"/>
-                    </a:gs>
-                  </a:gsLst>
-                  <a:lin ang="5400000" scaled="0"/>
-                </a:gradFill>
-                <a:latin typeface="+mn-lt"/>
-                <a:ea typeface="+mn-ea"/>
-                <a:cs typeface="+mn-cs"/>
-              </a:defRPr>
-            </a:lvl5pPr>
-            <a:lvl6pPr marL="2565040" indent="-233186" algn="l" defTabSz="932742" rtl="0" eaLnBrk="1" latinLnBrk="0" hangingPunct="1">
-              <a:spcBef>
-                <a:spcPct val="20000"/>
-              </a:spcBef>
-              <a:buFont typeface="Arial" pitchFamily="34" charset="0"/>
-              <a:buChar char="•"/>
-              <a:defRPr sz="2000" kern="1200">
-                <a:solidFill>
-                  <a:schemeClr val="tx1"/>
-                </a:solidFill>
-                <a:latin typeface="+mn-lt"/>
-                <a:ea typeface="+mn-ea"/>
-                <a:cs typeface="+mn-cs"/>
-              </a:defRPr>
-            </a:lvl6pPr>
-            <a:lvl7pPr marL="3031412" indent="-233186" algn="l" defTabSz="932742" rtl="0" eaLnBrk="1" latinLnBrk="0" hangingPunct="1">
-              <a:spcBef>
-                <a:spcPct val="20000"/>
-              </a:spcBef>
-              <a:buFont typeface="Arial" pitchFamily="34" charset="0"/>
-              <a:buChar char="•"/>
-              <a:defRPr sz="2000" kern="1200">
-                <a:solidFill>
-                  <a:schemeClr val="tx1"/>
-                </a:solidFill>
-                <a:latin typeface="+mn-lt"/>
-                <a:ea typeface="+mn-ea"/>
-                <a:cs typeface="+mn-cs"/>
-              </a:defRPr>
-            </a:lvl7pPr>
-            <a:lvl8pPr marL="3497783" indent="-233186" algn="l" defTabSz="932742" rtl="0" eaLnBrk="1" latinLnBrk="0" hangingPunct="1">
-              <a:spcBef>
-                <a:spcPct val="20000"/>
-              </a:spcBef>
-              <a:buFont typeface="Arial" pitchFamily="34" charset="0"/>
-              <a:buChar char="•"/>
-              <a:defRPr sz="2000" kern="1200">
-                <a:solidFill>
-                  <a:schemeClr val="tx1"/>
-                </a:solidFill>
-                <a:latin typeface="+mn-lt"/>
-                <a:ea typeface="+mn-ea"/>
-                <a:cs typeface="+mn-cs"/>
-              </a:defRPr>
-            </a:lvl8pPr>
-            <a:lvl9pPr marL="3964155" indent="-233186" algn="l" defTabSz="932742" rtl="0" eaLnBrk="1" latinLnBrk="0" hangingPunct="1">
-              <a:spcBef>
-                <a:spcPct val="20000"/>
-              </a:spcBef>
-              <a:buFont typeface="Arial" pitchFamily="34" charset="0"/>
-              <a:buChar char="•"/>
-              <a:defRPr sz="2000" kern="1200">
-                <a:solidFill>
-                  <a:schemeClr val="tx1"/>
-                </a:solidFill>
-                <a:latin typeface="+mn-lt"/>
-                <a:ea typeface="+mn-ea"/>
-                <a:cs typeface="+mn-cs"/>
-              </a:defRPr>
-            </a:lvl9pPr>
-          </a:lstStyle>
-          <a:p>
-            <a:pPr marL="0" indent="0">
-              <a:buNone/>
-            </a:pPr>
-            <a:endParaRPr lang="en-US" sz="3529" dirty="0"/>
-          </a:p>
-        </p:txBody>
-      </p:sp>
-      <p:grpSp>
-        <p:nvGrpSpPr>
-          <p:cNvPr id="17" name="Group 16">
-            <a:extLst>
-              <a:ext uri="{FF2B5EF4-FFF2-40B4-BE49-F238E27FC236}">
-                <a16:creationId xmlns:a16="http://schemas.microsoft.com/office/drawing/2014/main" id="{85760F5F-DA23-7541-A434-99380771116A}"/>
-              </a:ext>
-            </a:extLst>
-          </p:cNvPr>
-          <p:cNvGrpSpPr/>
-          <p:nvPr/>
-        </p:nvGrpSpPr>
-        <p:grpSpPr>
-          <a:xfrm>
-            <a:off x="1572132" y="2064108"/>
-            <a:ext cx="9047737" cy="3137487"/>
-            <a:chOff x="2710874" y="2582838"/>
-            <a:chExt cx="9229163" cy="3200400"/>
-          </a:xfrm>
-        </p:grpSpPr>
-        <p:pic>
-          <p:nvPicPr>
-            <p:cNvPr id="13" name="Picture 12" descr="A close up of a logo&#10;&#10;Description automatically generated">
-              <a:extLst>
-                <a:ext uri="{FF2B5EF4-FFF2-40B4-BE49-F238E27FC236}">
-                  <a16:creationId xmlns:a16="http://schemas.microsoft.com/office/drawing/2014/main" id="{DCE18889-DD5A-CA4B-83AA-CEEDB5159C19}"/>
-                </a:ext>
-              </a:extLst>
-            </p:cNvPr>
-            <p:cNvPicPr>
-              <a:picLocks noChangeAspect="1"/>
-            </p:cNvPicPr>
-            <p:nvPr/>
-          </p:nvPicPr>
-          <p:blipFill>
-            <a:blip r:embed="rId2"/>
-            <a:stretch>
-              <a:fillRect/>
-            </a:stretch>
-          </p:blipFill>
-          <p:spPr>
-            <a:xfrm>
-              <a:off x="2710874" y="2582838"/>
-              <a:ext cx="3592591" cy="3200400"/>
-            </a:xfrm>
-            <a:prstGeom prst="rect">
-              <a:avLst/>
-            </a:prstGeom>
-          </p:spPr>
-        </p:pic>
-        <p:pic>
-          <p:nvPicPr>
-            <p:cNvPr id="15" name="Picture 14" descr="A close up of a logo&#10;&#10;Description automatically generated">
-              <a:extLst>
-                <a:ext uri="{FF2B5EF4-FFF2-40B4-BE49-F238E27FC236}">
-                  <a16:creationId xmlns:a16="http://schemas.microsoft.com/office/drawing/2014/main" id="{E0AF74BC-DB0D-394D-BA83-D6E2120CF7A7}"/>
-                </a:ext>
-              </a:extLst>
-            </p:cNvPr>
-            <p:cNvPicPr>
-              <a:picLocks noChangeAspect="1"/>
-            </p:cNvPicPr>
-            <p:nvPr/>
-          </p:nvPicPr>
-          <p:blipFill>
-            <a:blip r:embed="rId3"/>
-            <a:stretch>
-              <a:fillRect/>
-            </a:stretch>
-          </p:blipFill>
-          <p:spPr>
-            <a:xfrm>
-              <a:off x="8739637" y="2582838"/>
-              <a:ext cx="3200400" cy="3200400"/>
-            </a:xfrm>
-            <a:prstGeom prst="rect">
-              <a:avLst/>
-            </a:prstGeom>
-          </p:spPr>
-        </p:pic>
-        <p:sp>
-          <p:nvSpPr>
-            <p:cNvPr id="16" name="TextBox 15">
-              <a:extLst>
-                <a:ext uri="{FF2B5EF4-FFF2-40B4-BE49-F238E27FC236}">
-                  <a16:creationId xmlns:a16="http://schemas.microsoft.com/office/drawing/2014/main" id="{87EB81A6-7926-E245-8CF2-13E90FAFA446}"/>
-                </a:ext>
-              </a:extLst>
-            </p:cNvPr>
-            <p:cNvSpPr txBox="1"/>
-            <p:nvPr/>
-          </p:nvSpPr>
-          <p:spPr>
-            <a:xfrm>
-              <a:off x="6485690" y="2657235"/>
-              <a:ext cx="1639841" cy="3051472"/>
-            </a:xfrm>
-            <a:prstGeom prst="rect">
-              <a:avLst/>
-            </a:prstGeom>
-            <a:noFill/>
-          </p:spPr>
-          <p:txBody>
-            <a:bodyPr wrap="none" lIns="179285" tIns="143428" rIns="179285" bIns="143428" rtlCol="0">
-              <a:spAutoFit/>
-            </a:bodyPr>
-            <a:lstStyle/>
-            <a:p>
-              <a:pPr>
-                <a:lnSpc>
-                  <a:spcPct val="90000"/>
-                </a:lnSpc>
-                <a:spcAft>
-                  <a:spcPts val="588"/>
-                </a:spcAft>
-              </a:pPr>
-              <a:r>
-                <a:rPr lang="en-US" sz="19508" dirty="0">
-                  <a:gradFill>
-                    <a:gsLst>
-                      <a:gs pos="2917">
-                        <a:schemeClr val="tx1"/>
-                      </a:gs>
-                      <a:gs pos="30000">
-                        <a:schemeClr val="tx1"/>
-                      </a:gs>
-                    </a:gsLst>
-                    <a:lin ang="5400000" scaled="0"/>
-                  </a:gradFill>
-                </a:rPr>
-                <a:t>+</a:t>
-              </a:r>
-            </a:p>
-          </p:txBody>
-        </p:sp>
-      </p:grpSp>
-    </p:spTree>
-    <p:extLst>
-      <p:ext uri="{BB962C8B-B14F-4D97-AF65-F5344CB8AC3E}">
-        <p14:creationId xmlns:p14="http://schemas.microsoft.com/office/powerpoint/2010/main" val="3485800890"/>
-      </p:ext>
-    </p:extLst>
-  </p:cSld>
-  <p:clrMapOvr>
-    <a:masterClrMapping/>
-  </p:clrMapOvr>
-</p:sld>
-</file>
-
-<file path=ppt/slides/slide8.xml><?xml version="1.0" encoding="utf-8"?>
-<p:sld xmlns:a="http://schemas.openxmlformats.org/drawingml/2006/main" xmlns:r="http://schemas.openxmlformats.org/officeDocument/2006/relationships" xmlns:p="http://schemas.openxmlformats.org/presentationml/2006/main">
-  <p:cSld>
-    <p:spTree>
-      <p:nvGrpSpPr>
-        <p:cNvPr id="1" name=""/>
-        <p:cNvGrpSpPr/>
-        <p:nvPr/>
-      </p:nvGrpSpPr>
-      <p:grpSpPr>
-        <a:xfrm>
-          <a:off x="0" y="0"/>
-          <a:ext cx="0" cy="0"/>
-          <a:chOff x="0" y="0"/>
-          <a:chExt cx="0" cy="0"/>
-        </a:xfrm>
-      </p:grpSpPr>
-      <p:sp>
-        <p:nvSpPr>
-          <p:cNvPr id="2" name="Title 1"/>
-          <p:cNvSpPr>
-            <a:spLocks noGrp="1"/>
-          </p:cNvSpPr>
-          <p:nvPr>
-            <p:ph type="title"/>
-          </p:nvPr>
-        </p:nvSpPr>
-        <p:spPr>
-          <a:xfrm>
-            <a:off x="269239" y="2849686"/>
-            <a:ext cx="11653523" cy="1158629"/>
-          </a:xfrm>
-        </p:spPr>
-        <p:txBody>
-          <a:bodyPr/>
-          <a:lstStyle/>
-          <a:p>
-            <a:r>
-              <a:rPr lang="en-US" dirty="0"/>
-              <a:t>Sharing User Interface</a:t>
-            </a:r>
-          </a:p>
-        </p:txBody>
-      </p:sp>
-    </p:spTree>
-    <p:extLst>
-      <p:ext uri="{BB962C8B-B14F-4D97-AF65-F5344CB8AC3E}">
-        <p14:creationId xmlns:p14="http://schemas.microsoft.com/office/powerpoint/2010/main" val="373563939"/>
-      </p:ext>
-    </p:extLst>
-  </p:cSld>
-  <p:clrMapOvr>
-    <a:masterClrMapping/>
-  </p:clrMapOvr>
-</p:sld>
-</file>
-
-<file path=ppt/slides/slide9.xml><?xml version="1.0" encoding="utf-8"?>
 <p:sld xmlns:a="http://schemas.openxmlformats.org/drawingml/2006/main" xmlns:r="http://schemas.openxmlformats.org/officeDocument/2006/relationships" xmlns:p="http://schemas.openxmlformats.org/presentationml/2006/main">
   <p:cSld>
     <p:spTree>
@@ -13328,6 +11666,709 @@
 </p:sld>
 </file>
 
+<file path=ppt/slides/slide7.xml><?xml version="1.0" encoding="utf-8"?>
+<p:sld xmlns:a="http://schemas.openxmlformats.org/drawingml/2006/main" xmlns:r="http://schemas.openxmlformats.org/officeDocument/2006/relationships" xmlns:p="http://schemas.openxmlformats.org/presentationml/2006/main">
+  <p:cSld>
+    <p:spTree>
+      <p:nvGrpSpPr>
+        <p:cNvPr id="1" name=""/>
+        <p:cNvGrpSpPr/>
+        <p:nvPr/>
+      </p:nvGrpSpPr>
+      <p:grpSpPr>
+        <a:xfrm>
+          <a:off x="0" y="0"/>
+          <a:ext cx="0" cy="0"/>
+          <a:chOff x="0" y="0"/>
+          <a:chExt cx="0" cy="0"/>
+        </a:xfrm>
+      </p:grpSpPr>
+      <p:grpSp>
+        <p:nvGrpSpPr>
+          <p:cNvPr id="2" name="Group 1">
+            <a:extLst>
+              <a:ext uri="{FF2B5EF4-FFF2-40B4-BE49-F238E27FC236}">
+                <a16:creationId xmlns:a16="http://schemas.microsoft.com/office/drawing/2014/main" id="{DE94121D-A6DB-FA48-B29A-E0367F939463}"/>
+              </a:ext>
+            </a:extLst>
+          </p:cNvPr>
+          <p:cNvGrpSpPr/>
+          <p:nvPr/>
+        </p:nvGrpSpPr>
+        <p:grpSpPr>
+          <a:xfrm>
+            <a:off x="-2177857" y="1290110"/>
+            <a:ext cx="8279948" cy="4947503"/>
+            <a:chOff x="-2177857" y="1290110"/>
+            <a:chExt cx="8279948" cy="4947503"/>
+          </a:xfrm>
+        </p:grpSpPr>
+        <p:pic>
+          <p:nvPicPr>
+            <p:cNvPr id="11" name="Picture 10" descr="PC_FrontFrame.png"/>
+            <p:cNvPicPr>
+              <a:picLocks noChangeAspect="1"/>
+            </p:cNvPicPr>
+            <p:nvPr/>
+          </p:nvPicPr>
+          <p:blipFill>
+            <a:blip r:embed="rId3" cstate="email">
+              <a:extLst>
+                <a:ext uri="{28A0092B-C50C-407E-A947-70E740481C1C}">
+                  <a14:useLocalDpi xmlns:a14="http://schemas.microsoft.com/office/drawing/2010/main"/>
+                </a:ext>
+              </a:extLst>
+            </a:blip>
+            <a:stretch>
+              <a:fillRect/>
+            </a:stretch>
+          </p:blipFill>
+          <p:spPr>
+            <a:xfrm>
+              <a:off x="-2177857" y="1290110"/>
+              <a:ext cx="8279948" cy="4947503"/>
+            </a:xfrm>
+            <a:prstGeom prst="rect">
+              <a:avLst/>
+            </a:prstGeom>
+          </p:spPr>
+        </p:pic>
+        <p:pic>
+          <p:nvPicPr>
+            <p:cNvPr id="12" name="Picture 11"/>
+            <p:cNvPicPr>
+              <a:picLocks noChangeAspect="1"/>
+            </p:cNvPicPr>
+            <p:nvPr/>
+          </p:nvPicPr>
+          <p:blipFill>
+            <a:blip r:embed="rId4"/>
+            <a:stretch>
+              <a:fillRect/>
+            </a:stretch>
+          </p:blipFill>
+          <p:spPr>
+            <a:xfrm>
+              <a:off x="-1144727" y="1656126"/>
+              <a:ext cx="6203552" cy="3778135"/>
+            </a:xfrm>
+            <a:prstGeom prst="rect">
+              <a:avLst/>
+            </a:prstGeom>
+          </p:spPr>
+        </p:pic>
+      </p:grpSp>
+      <p:sp>
+        <p:nvSpPr>
+          <p:cNvPr id="3" name="Title 2"/>
+          <p:cNvSpPr>
+            <a:spLocks noGrp="1"/>
+          </p:cNvSpPr>
+          <p:nvPr>
+            <p:ph type="title"/>
+          </p:nvPr>
+        </p:nvSpPr>
+        <p:spPr>
+          <a:xfrm>
+            <a:off x="269241" y="289957"/>
+            <a:ext cx="11655840" cy="899537"/>
+          </a:xfrm>
+        </p:spPr>
+        <p:txBody>
+          <a:bodyPr/>
+          <a:lstStyle/>
+          <a:p>
+            <a:r>
+              <a:rPr lang="en-US" dirty="0">
+                <a:solidFill>
+                  <a:schemeClr val="tx1"/>
+                </a:solidFill>
+              </a:rPr>
+              <a:t>Visual Studio (PC)</a:t>
+            </a:r>
+          </a:p>
+        </p:txBody>
+      </p:sp>
+      <p:sp>
+        <p:nvSpPr>
+          <p:cNvPr id="15" name="Title 2"/>
+          <p:cNvSpPr txBox="1">
+            <a:spLocks/>
+          </p:cNvSpPr>
+          <p:nvPr/>
+        </p:nvSpPr>
+        <p:spPr>
+          <a:xfrm>
+            <a:off x="6311318" y="289957"/>
+            <a:ext cx="5657387" cy="899538"/>
+          </a:xfrm>
+          <a:prstGeom prst="rect">
+            <a:avLst/>
+          </a:prstGeom>
+        </p:spPr>
+        <p:txBody>
+          <a:bodyPr vert="horz" wrap="square" lIns="146284" tIns="91427" rIns="146284" bIns="91427" rtlCol="0" anchor="t">
+            <a:noAutofit/>
+          </a:bodyPr>
+          <a:lstStyle>
+            <a:lvl1pPr algn="l" defTabSz="914367" rtl="0" eaLnBrk="1" latinLnBrk="0" hangingPunct="1">
+              <a:lnSpc>
+                <a:spcPct val="90000"/>
+              </a:lnSpc>
+              <a:spcBef>
+                <a:spcPct val="0"/>
+              </a:spcBef>
+              <a:buNone/>
+              <a:defRPr lang="en-US" sz="4705" b="0" kern="1200" cap="none" spc="-100" baseline="0" dirty="0" smtClean="0">
+                <a:ln w="3175">
+                  <a:noFill/>
+                </a:ln>
+                <a:gradFill>
+                  <a:gsLst>
+                    <a:gs pos="1250">
+                      <a:schemeClr val="tx1"/>
+                    </a:gs>
+                    <a:gs pos="100000">
+                      <a:schemeClr val="tx1"/>
+                    </a:gs>
+                  </a:gsLst>
+                  <a:lin ang="5400000" scaled="0"/>
+                </a:gradFill>
+                <a:effectLst/>
+                <a:latin typeface="+mj-lt"/>
+                <a:ea typeface="+mn-ea"/>
+                <a:cs typeface="Segoe UI" pitchFamily="34" charset="0"/>
+              </a:defRPr>
+            </a:lvl1pPr>
+          </a:lstStyle>
+          <a:p>
+            <a:pPr defTabSz="457157">
+              <a:defRPr/>
+            </a:pPr>
+            <a:r>
+              <a:rPr lang="en-US" sz="4800" spc="-50" dirty="0">
+                <a:solidFill>
+                  <a:schemeClr val="tx1"/>
+                </a:solidFill>
+                <a:latin typeface="Segoe UI Light" panose="020B0502040204020203" pitchFamily="34" charset="0"/>
+                <a:ea typeface="Segoe UI" charset="0"/>
+                <a:cs typeface="Segoe UI" charset="0"/>
+              </a:rPr>
+              <a:t>Visual Studio for Mac</a:t>
+            </a:r>
+          </a:p>
+        </p:txBody>
+      </p:sp>
+      <p:pic>
+        <p:nvPicPr>
+          <p:cNvPr id="8" name="Picture 7" descr="A screenshot of a computer monitor&#10;&#10;Description automatically generated">
+            <a:extLst>
+              <a:ext uri="{FF2B5EF4-FFF2-40B4-BE49-F238E27FC236}">
+                <a16:creationId xmlns:a16="http://schemas.microsoft.com/office/drawing/2014/main" id="{78AF5D0E-6E54-9F42-A3C3-0AB0C21CEDB8}"/>
+              </a:ext>
+            </a:extLst>
+          </p:cNvPr>
+          <p:cNvPicPr>
+            <a:picLocks noChangeAspect="1"/>
+          </p:cNvPicPr>
+          <p:nvPr/>
+        </p:nvPicPr>
+        <p:blipFill>
+          <a:blip r:embed="rId5"/>
+          <a:stretch>
+            <a:fillRect/>
+          </a:stretch>
+        </p:blipFill>
+        <p:spPr>
+          <a:xfrm>
+            <a:off x="6850034" y="1189494"/>
+            <a:ext cx="8279948" cy="5128346"/>
+          </a:xfrm>
+          <a:prstGeom prst="rect">
+            <a:avLst/>
+          </a:prstGeom>
+        </p:spPr>
+      </p:pic>
+    </p:spTree>
+    <p:extLst>
+      <p:ext uri="{BB962C8B-B14F-4D97-AF65-F5344CB8AC3E}">
+        <p14:creationId xmlns:p14="http://schemas.microsoft.com/office/powerpoint/2010/main" val="137712924"/>
+      </p:ext>
+    </p:extLst>
+  </p:cSld>
+  <p:clrMapOvr>
+    <a:masterClrMapping/>
+  </p:clrMapOvr>
+</p:sld>
+</file>
+
+<file path=ppt/slides/slide8.xml><?xml version="1.0" encoding="utf-8"?>
+<p:sld xmlns:a="http://schemas.openxmlformats.org/drawingml/2006/main" xmlns:r="http://schemas.openxmlformats.org/officeDocument/2006/relationships" xmlns:p="http://schemas.openxmlformats.org/presentationml/2006/main">
+  <p:cSld>
+    <p:spTree>
+      <p:nvGrpSpPr>
+        <p:cNvPr id="1" name=""/>
+        <p:cNvGrpSpPr/>
+        <p:nvPr/>
+      </p:nvGrpSpPr>
+      <p:grpSpPr>
+        <a:xfrm>
+          <a:off x="0" y="0"/>
+          <a:ext cx="0" cy="0"/>
+          <a:chOff x="0" y="0"/>
+          <a:chExt cx="0" cy="0"/>
+        </a:xfrm>
+      </p:grpSpPr>
+      <p:sp>
+        <p:nvSpPr>
+          <p:cNvPr id="2" name="Title 1">
+            <a:extLst>
+              <a:ext uri="{FF2B5EF4-FFF2-40B4-BE49-F238E27FC236}">
+                <a16:creationId xmlns:a16="http://schemas.microsoft.com/office/drawing/2014/main" id="{1540FD78-B5E6-FE4A-8332-386F19518AFE}"/>
+              </a:ext>
+            </a:extLst>
+          </p:cNvPr>
+          <p:cNvSpPr>
+            <a:spLocks noGrp="1"/>
+          </p:cNvSpPr>
+          <p:nvPr>
+            <p:ph type="title"/>
+          </p:nvPr>
+        </p:nvSpPr>
+        <p:spPr/>
+        <p:txBody>
+          <a:bodyPr/>
+          <a:lstStyle/>
+          <a:p>
+            <a:r>
+              <a:rPr lang="en-US" dirty="0"/>
+              <a:t>Quick Review</a:t>
+            </a:r>
+          </a:p>
+        </p:txBody>
+      </p:sp>
+    </p:spTree>
+    <p:extLst>
+      <p:ext uri="{BB962C8B-B14F-4D97-AF65-F5344CB8AC3E}">
+        <p14:creationId xmlns:p14="http://schemas.microsoft.com/office/powerpoint/2010/main" val="2987184589"/>
+      </p:ext>
+    </p:extLst>
+  </p:cSld>
+  <p:clrMapOvr>
+    <a:masterClrMapping/>
+  </p:clrMapOvr>
+</p:sld>
+</file>
+
+<file path=ppt/slides/slide9.xml><?xml version="1.0" encoding="utf-8"?>
+<p:sld xmlns:a="http://schemas.openxmlformats.org/drawingml/2006/main" xmlns:r="http://schemas.openxmlformats.org/officeDocument/2006/relationships" xmlns:p="http://schemas.openxmlformats.org/presentationml/2006/main">
+  <p:cSld>
+    <p:spTree>
+      <p:nvGrpSpPr>
+        <p:cNvPr id="1" name=""/>
+        <p:cNvGrpSpPr/>
+        <p:nvPr/>
+      </p:nvGrpSpPr>
+      <p:grpSpPr>
+        <a:xfrm>
+          <a:off x="0" y="0"/>
+          <a:ext cx="0" cy="0"/>
+          <a:chOff x="0" y="0"/>
+          <a:chExt cx="0" cy="0"/>
+        </a:xfrm>
+      </p:grpSpPr>
+      <p:sp>
+        <p:nvSpPr>
+          <p:cNvPr id="2" name="Title 1">
+            <a:extLst>
+              <a:ext uri="{FF2B5EF4-FFF2-40B4-BE49-F238E27FC236}">
+                <a16:creationId xmlns:a16="http://schemas.microsoft.com/office/drawing/2014/main" id="{667DA6D6-13B1-434C-B9AA-70628C006786}"/>
+              </a:ext>
+            </a:extLst>
+          </p:cNvPr>
+          <p:cNvSpPr>
+            <a:spLocks noGrp="1"/>
+          </p:cNvSpPr>
+          <p:nvPr>
+            <p:ph type="title"/>
+          </p:nvPr>
+        </p:nvSpPr>
+        <p:spPr/>
+        <p:txBody>
+          <a:bodyPr/>
+          <a:lstStyle/>
+          <a:p>
+            <a:r>
+              <a:rPr lang="en-US" dirty="0"/>
+              <a:t>Xamarin</a:t>
+            </a:r>
+          </a:p>
+        </p:txBody>
+      </p:sp>
+      <p:sp>
+        <p:nvSpPr>
+          <p:cNvPr id="3" name="Text Placeholder 5">
+            <a:extLst>
+              <a:ext uri="{FF2B5EF4-FFF2-40B4-BE49-F238E27FC236}">
+                <a16:creationId xmlns:a16="http://schemas.microsoft.com/office/drawing/2014/main" id="{85E1F499-FD44-F14A-852E-5A905DF915C9}"/>
+              </a:ext>
+            </a:extLst>
+          </p:cNvPr>
+          <p:cNvSpPr txBox="1">
+            <a:spLocks/>
+          </p:cNvSpPr>
+          <p:nvPr/>
+        </p:nvSpPr>
+        <p:spPr>
+          <a:xfrm>
+            <a:off x="269240" y="1189495"/>
+            <a:ext cx="11655078" cy="1599150"/>
+          </a:xfrm>
+          <a:prstGeom prst="rect">
+            <a:avLst/>
+          </a:prstGeom>
+        </p:spPr>
+        <p:txBody>
+          <a:bodyPr/>
+          <a:lstStyle>
+            <a:lvl1pPr marL="228600" marR="0" indent="-228600" algn="l" defTabSz="932742" rtl="0" eaLnBrk="1" fontAlgn="auto" latinLnBrk="0" hangingPunct="1">
+              <a:lnSpc>
+                <a:spcPct val="90000"/>
+              </a:lnSpc>
+              <a:spcBef>
+                <a:spcPct val="20000"/>
+              </a:spcBef>
+              <a:spcAft>
+                <a:spcPts val="0"/>
+              </a:spcAft>
+              <a:buClrTx/>
+              <a:buSzPct val="90000"/>
+              <a:buFont typeface="Wingdings" panose="05000000000000000000" pitchFamily="2" charset="2"/>
+              <a:buChar char=""/>
+              <a:tabLst/>
+              <a:defRPr sz="3600" kern="1200" spc="0" baseline="0">
+                <a:gradFill>
+                  <a:gsLst>
+                    <a:gs pos="1250">
+                      <a:schemeClr val="tx1"/>
+                    </a:gs>
+                    <a:gs pos="100000">
+                      <a:schemeClr val="tx1"/>
+                    </a:gs>
+                  </a:gsLst>
+                  <a:lin ang="5400000" scaled="0"/>
+                </a:gradFill>
+                <a:latin typeface="+mj-lt"/>
+                <a:ea typeface="+mn-ea"/>
+                <a:cs typeface="+mn-cs"/>
+              </a:defRPr>
+            </a:lvl1pPr>
+            <a:lvl2pPr marL="457200" marR="0" indent="-228600" algn="l" defTabSz="932742" rtl="0" eaLnBrk="1" fontAlgn="auto" latinLnBrk="0" hangingPunct="1">
+              <a:lnSpc>
+                <a:spcPct val="90000"/>
+              </a:lnSpc>
+              <a:spcBef>
+                <a:spcPct val="20000"/>
+              </a:spcBef>
+              <a:spcAft>
+                <a:spcPts val="0"/>
+              </a:spcAft>
+              <a:buClrTx/>
+              <a:buSzPct val="90000"/>
+              <a:buFont typeface="Wingdings" panose="05000000000000000000" pitchFamily="2" charset="2"/>
+              <a:buChar char=""/>
+              <a:tabLst/>
+              <a:defRPr sz="2800" kern="1200" spc="0" baseline="0">
+                <a:gradFill>
+                  <a:gsLst>
+                    <a:gs pos="1250">
+                      <a:schemeClr val="tx1"/>
+                    </a:gs>
+                    <a:gs pos="100000">
+                      <a:schemeClr val="tx1"/>
+                    </a:gs>
+                  </a:gsLst>
+                  <a:lin ang="5400000" scaled="0"/>
+                </a:gradFill>
+                <a:latin typeface="+mn-lt"/>
+                <a:ea typeface="+mn-ea"/>
+                <a:cs typeface="+mn-cs"/>
+              </a:defRPr>
+            </a:lvl2pPr>
+            <a:lvl3pPr marL="685800" marR="0" indent="-228600" algn="l" defTabSz="932742" rtl="0" eaLnBrk="1" fontAlgn="auto" latinLnBrk="0" hangingPunct="1">
+              <a:lnSpc>
+                <a:spcPct val="90000"/>
+              </a:lnSpc>
+              <a:spcBef>
+                <a:spcPct val="20000"/>
+              </a:spcBef>
+              <a:spcAft>
+                <a:spcPts val="0"/>
+              </a:spcAft>
+              <a:buClrTx/>
+              <a:buSzPct val="90000"/>
+              <a:buFont typeface="Wingdings" panose="05000000000000000000" pitchFamily="2" charset="2"/>
+              <a:buChar char=""/>
+              <a:tabLst/>
+              <a:defRPr sz="2400" kern="1200" spc="0" baseline="0">
+                <a:gradFill>
+                  <a:gsLst>
+                    <a:gs pos="1250">
+                      <a:schemeClr val="tx1"/>
+                    </a:gs>
+                    <a:gs pos="100000">
+                      <a:schemeClr val="tx1"/>
+                    </a:gs>
+                  </a:gsLst>
+                  <a:lin ang="5400000" scaled="0"/>
+                </a:gradFill>
+                <a:latin typeface="+mn-lt"/>
+                <a:ea typeface="+mn-ea"/>
+                <a:cs typeface="+mn-cs"/>
+              </a:defRPr>
+            </a:lvl3pPr>
+            <a:lvl4pPr marL="914400" marR="0" indent="-228600" algn="l" defTabSz="932742" rtl="0" eaLnBrk="1" fontAlgn="auto" latinLnBrk="0" hangingPunct="1">
+              <a:lnSpc>
+                <a:spcPct val="90000"/>
+              </a:lnSpc>
+              <a:spcBef>
+                <a:spcPct val="20000"/>
+              </a:spcBef>
+              <a:spcAft>
+                <a:spcPts val="0"/>
+              </a:spcAft>
+              <a:buClrTx/>
+              <a:buSzPct val="90000"/>
+              <a:buFont typeface="Wingdings" panose="05000000000000000000" pitchFamily="2" charset="2"/>
+              <a:buChar char=""/>
+              <a:tabLst/>
+              <a:defRPr sz="2200" kern="1200" spc="0" baseline="0">
+                <a:gradFill>
+                  <a:gsLst>
+                    <a:gs pos="1250">
+                      <a:schemeClr val="tx1"/>
+                    </a:gs>
+                    <a:gs pos="100000">
+                      <a:schemeClr val="tx1"/>
+                    </a:gs>
+                  </a:gsLst>
+                  <a:lin ang="5400000" scaled="0"/>
+                </a:gradFill>
+                <a:latin typeface="+mn-lt"/>
+                <a:ea typeface="+mn-ea"/>
+                <a:cs typeface="+mn-cs"/>
+              </a:defRPr>
+            </a:lvl4pPr>
+            <a:lvl5pPr marL="1143000" marR="0" indent="-228600" algn="l" defTabSz="932742" rtl="0" eaLnBrk="1" fontAlgn="auto" latinLnBrk="0" hangingPunct="1">
+              <a:lnSpc>
+                <a:spcPct val="90000"/>
+              </a:lnSpc>
+              <a:spcBef>
+                <a:spcPct val="20000"/>
+              </a:spcBef>
+              <a:spcAft>
+                <a:spcPts val="0"/>
+              </a:spcAft>
+              <a:buClrTx/>
+              <a:buSzPct val="90000"/>
+              <a:buFont typeface="Wingdings" panose="05000000000000000000" pitchFamily="2" charset="2"/>
+              <a:buChar char=""/>
+              <a:tabLst/>
+              <a:defRPr sz="2200" kern="1200" spc="0" baseline="0">
+                <a:gradFill>
+                  <a:gsLst>
+                    <a:gs pos="1250">
+                      <a:schemeClr val="tx1"/>
+                    </a:gs>
+                    <a:gs pos="100000">
+                      <a:schemeClr val="tx1"/>
+                    </a:gs>
+                  </a:gsLst>
+                  <a:lin ang="5400000" scaled="0"/>
+                </a:gradFill>
+                <a:latin typeface="+mn-lt"/>
+                <a:ea typeface="+mn-ea"/>
+                <a:cs typeface="+mn-cs"/>
+              </a:defRPr>
+            </a:lvl5pPr>
+            <a:lvl6pPr marL="2565040" indent="-233186" algn="l" defTabSz="932742" rtl="0" eaLnBrk="1" latinLnBrk="0" hangingPunct="1">
+              <a:spcBef>
+                <a:spcPct val="20000"/>
+              </a:spcBef>
+              <a:buFont typeface="Arial" pitchFamily="34" charset="0"/>
+              <a:buChar char="•"/>
+              <a:defRPr sz="2000" kern="1200">
+                <a:solidFill>
+                  <a:schemeClr val="tx1"/>
+                </a:solidFill>
+                <a:latin typeface="+mn-lt"/>
+                <a:ea typeface="+mn-ea"/>
+                <a:cs typeface="+mn-cs"/>
+              </a:defRPr>
+            </a:lvl6pPr>
+            <a:lvl7pPr marL="3031412" indent="-233186" algn="l" defTabSz="932742" rtl="0" eaLnBrk="1" latinLnBrk="0" hangingPunct="1">
+              <a:spcBef>
+                <a:spcPct val="20000"/>
+              </a:spcBef>
+              <a:buFont typeface="Arial" pitchFamily="34" charset="0"/>
+              <a:buChar char="•"/>
+              <a:defRPr sz="2000" kern="1200">
+                <a:solidFill>
+                  <a:schemeClr val="tx1"/>
+                </a:solidFill>
+                <a:latin typeface="+mn-lt"/>
+                <a:ea typeface="+mn-ea"/>
+                <a:cs typeface="+mn-cs"/>
+              </a:defRPr>
+            </a:lvl7pPr>
+            <a:lvl8pPr marL="3497783" indent="-233186" algn="l" defTabSz="932742" rtl="0" eaLnBrk="1" latinLnBrk="0" hangingPunct="1">
+              <a:spcBef>
+                <a:spcPct val="20000"/>
+              </a:spcBef>
+              <a:buFont typeface="Arial" pitchFamily="34" charset="0"/>
+              <a:buChar char="•"/>
+              <a:defRPr sz="2000" kern="1200">
+                <a:solidFill>
+                  <a:schemeClr val="tx1"/>
+                </a:solidFill>
+                <a:latin typeface="+mn-lt"/>
+                <a:ea typeface="+mn-ea"/>
+                <a:cs typeface="+mn-cs"/>
+              </a:defRPr>
+            </a:lvl8pPr>
+            <a:lvl9pPr marL="3964155" indent="-233186" algn="l" defTabSz="932742" rtl="0" eaLnBrk="1" latinLnBrk="0" hangingPunct="1">
+              <a:spcBef>
+                <a:spcPct val="20000"/>
+              </a:spcBef>
+              <a:buFont typeface="Arial" pitchFamily="34" charset="0"/>
+              <a:buChar char="•"/>
+              <a:defRPr sz="2000" kern="1200">
+                <a:solidFill>
+                  <a:schemeClr val="tx1"/>
+                </a:solidFill>
+                <a:latin typeface="+mn-lt"/>
+                <a:ea typeface="+mn-ea"/>
+                <a:cs typeface="+mn-cs"/>
+              </a:defRPr>
+            </a:lvl9pPr>
+          </a:lstStyle>
+          <a:p>
+            <a:r>
+              <a:rPr lang="en-US" sz="3529" dirty="0">
+                <a:solidFill>
+                  <a:schemeClr val="tx1"/>
+                </a:solidFill>
+              </a:rPr>
+              <a:t>Native Mobile Apps in .NET</a:t>
+            </a:r>
+          </a:p>
+          <a:p>
+            <a:pPr lvl="1"/>
+            <a:r>
+              <a:rPr lang="en-US" sz="2729" dirty="0">
+                <a:solidFill>
+                  <a:schemeClr val="tx1"/>
+                </a:solidFill>
+              </a:rPr>
+              <a:t>Create native iOS apps</a:t>
+            </a:r>
+          </a:p>
+          <a:p>
+            <a:pPr lvl="1"/>
+            <a:r>
+              <a:rPr lang="en-US" sz="2729" dirty="0">
+                <a:solidFill>
+                  <a:schemeClr val="tx1"/>
+                </a:solidFill>
+              </a:rPr>
+              <a:t>Create native Android apps</a:t>
+            </a:r>
+          </a:p>
+          <a:p>
+            <a:r>
+              <a:rPr lang="en-US" sz="3529" dirty="0" err="1">
+                <a:solidFill>
+                  <a:schemeClr val="tx1"/>
+                </a:solidFill>
+              </a:rPr>
+              <a:t>Xamarin.Forms</a:t>
+            </a:r>
+            <a:endParaRPr lang="en-US" sz="3529" dirty="0">
+              <a:solidFill>
+                <a:schemeClr val="tx1"/>
+              </a:solidFill>
+            </a:endParaRPr>
+          </a:p>
+          <a:p>
+            <a:pPr lvl="1"/>
+            <a:r>
+              <a:rPr lang="en-US" sz="2729" dirty="0">
+                <a:solidFill>
+                  <a:schemeClr val="tx1"/>
+                </a:solidFill>
+              </a:rPr>
+              <a:t>Share UI Code</a:t>
+            </a:r>
+            <a:endParaRPr lang="en-US" sz="3529" dirty="0">
+              <a:solidFill>
+                <a:schemeClr val="tx1"/>
+              </a:solidFill>
+            </a:endParaRPr>
+          </a:p>
+          <a:p>
+            <a:r>
+              <a:rPr lang="en-US" sz="3530" dirty="0">
+                <a:solidFill>
+                  <a:schemeClr val="tx1"/>
+                </a:solidFill>
+              </a:rPr>
+              <a:t>Visual Studio</a:t>
+            </a:r>
+          </a:p>
+          <a:p>
+            <a:pPr lvl="1"/>
+            <a:r>
+              <a:rPr lang="en-US" sz="2729" dirty="0">
+                <a:solidFill>
+                  <a:schemeClr val="tx1"/>
+                </a:solidFill>
+              </a:rPr>
+              <a:t>Develop in Visual Studio (PC) </a:t>
+            </a:r>
+          </a:p>
+          <a:p>
+            <a:pPr lvl="1"/>
+            <a:r>
+              <a:rPr lang="en-US" sz="2729" dirty="0">
+                <a:solidFill>
+                  <a:schemeClr val="tx1"/>
+                </a:solidFill>
+              </a:rPr>
+              <a:t>Develop in Visual Studio for Mac</a:t>
+            </a:r>
+          </a:p>
+          <a:p>
+            <a:endParaRPr lang="en-US" sz="3529" dirty="0">
+              <a:solidFill>
+                <a:schemeClr val="tx1"/>
+              </a:solidFill>
+            </a:endParaRPr>
+          </a:p>
+        </p:txBody>
+      </p:sp>
+    </p:spTree>
+    <p:extLst>
+      <p:ext uri="{BB962C8B-B14F-4D97-AF65-F5344CB8AC3E}">
+        <p14:creationId xmlns:p14="http://schemas.microsoft.com/office/powerpoint/2010/main" val="346288692"/>
+      </p:ext>
+    </p:extLst>
+  </p:cSld>
+  <p:clrMapOvr>
+    <a:masterClrMapping/>
+  </p:clrMapOvr>
+</p:sld>
+</file>
+
 <file path=ppt/theme/theme1.xml><?xml version="1.0" encoding="utf-8"?>
 <a:theme xmlns:a="http://schemas.openxmlformats.org/drawingml/2006/main" name="Dotnet_Template">
   <a:themeElements>
@@ -13926,15 +12967,6 @@
 </file>
 
 <file path=customXml/item1.xml><?xml version="1.0" encoding="utf-8"?>
-<?mso-contentType ?>
-<FormTemplates xmlns="http://schemas.microsoft.com/sharepoint/v3/contenttype/forms">
-  <Display>DocumentLibraryForm</Display>
-  <Edit>DocumentLibraryForm</Edit>
-  <New>DocumentLibraryForm</New>
-</FormTemplates>
-</file>
-
-<file path=customXml/item2.xml><?xml version="1.0" encoding="utf-8"?>
 <ct:contentTypeSchema xmlns:ct="http://schemas.microsoft.com/office/2006/metadata/contentType" xmlns:ma="http://schemas.microsoft.com/office/2006/metadata/properties/metaAttributes" ct:_="" ma:_="" ma:contentTypeName="Document" ma:contentTypeID="0x01010022F88B0CCF1BBA489747F146E6B5E06D" ma:contentTypeVersion="15" ma:contentTypeDescription="Create a new document." ma:contentTypeScope="" ma:versionID="3a81cc4177a2cfbc51d69d3922f78c36">
   <xsd:schema xmlns:xsd="http://www.w3.org/2001/XMLSchema" xmlns:xs="http://www.w3.org/2001/XMLSchema" xmlns:p="http://schemas.microsoft.com/office/2006/metadata/properties" xmlns:ns1="http://schemas.microsoft.com/sharepoint/v3" xmlns:ns2="569b343d-e775-480b-9b2b-6a6986deb9b0" xmlns:ns3="11245976-3b4d-4794-a754-317688483df2" targetNamespace="http://schemas.microsoft.com/office/2006/metadata/properties" ma:root="true" ma:fieldsID="b609d5801db63fe484c47c44deb589b2" ns1:_="" ns2:_="" ns3:_="">
     <xsd:import namespace="http://schemas.microsoft.com/sharepoint/v3"/>
@@ -14174,6 +13206,15 @@
 </ct:contentTypeSchema>
 </file>
 
+<file path=customXml/item2.xml><?xml version="1.0" encoding="utf-8"?>
+<?mso-contentType ?>
+<FormTemplates xmlns="http://schemas.microsoft.com/sharepoint/v3/contenttype/forms">
+  <Display>DocumentLibraryForm</Display>
+  <Edit>DocumentLibraryForm</Edit>
+  <New>DocumentLibraryForm</New>
+</FormTemplates>
+</file>
+
 <file path=customXml/item3.xml><?xml version="1.0" encoding="utf-8"?>
 <p:properties xmlns:p="http://schemas.microsoft.com/office/2006/metadata/properties" xmlns:xsi="http://www.w3.org/2001/XMLSchema-instance" xmlns:pc="http://schemas.microsoft.com/office/infopath/2007/PartnerControls">
   <documentManagement>
@@ -14193,14 +13234,6 @@
 </file>
 
 <file path=customXml/itemProps1.xml><?xml version="1.0" encoding="utf-8"?>
-<ds:datastoreItem xmlns:ds="http://schemas.openxmlformats.org/officeDocument/2006/customXml" ds:itemID="{093821A7-5528-48BE-BD00-067FBFDD28D5}">
-  <ds:schemaRefs>
-    <ds:schemaRef ds:uri="http://schemas.microsoft.com/sharepoint/v3/contenttype/forms"/>
-  </ds:schemaRefs>
-</ds:datastoreItem>
-</file>
-
-<file path=customXml/itemProps2.xml><?xml version="1.0" encoding="utf-8"?>
 <ds:datastoreItem xmlns:ds="http://schemas.openxmlformats.org/officeDocument/2006/customXml" ds:itemID="{3EC7A57B-883B-4750-9166-6F76DB12FD37}">
   <ds:schemaRefs>
     <ds:schemaRef ds:uri="http://schemas.microsoft.com/office/2006/metadata/contentType"/>
@@ -14220,6 +13253,14 @@
 </ds:datastoreItem>
 </file>
 
+<file path=customXml/itemProps2.xml><?xml version="1.0" encoding="utf-8"?>
+<ds:datastoreItem xmlns:ds="http://schemas.openxmlformats.org/officeDocument/2006/customXml" ds:itemID="{093821A7-5528-48BE-BD00-067FBFDD28D5}">
+  <ds:schemaRefs>
+    <ds:schemaRef ds:uri="http://schemas.microsoft.com/sharepoint/v3/contenttype/forms"/>
+  </ds:schemaRefs>
+</ds:datastoreItem>
+</file>
+
 <file path=customXml/itemProps3.xml><?xml version="1.0" encoding="utf-8"?>
 <ds:datastoreItem xmlns:ds="http://schemas.openxmlformats.org/officeDocument/2006/customXml" ds:itemID="{D23E43D6-DB2F-4C33-A8C8-D28F777A5DE7}">
   <ds:schemaRefs>

</xml_diff>